<commit_message>
How to use github pages
</commit_message>
<xml_diff>
--- a/How_To_Use_Github_pages.pptx
+++ b/How_To_Use_Github_pages.pptx
@@ -6,24 +6,21 @@
   </p:sldMasterIdLst>
   <p:sldIdLst>
     <p:sldId id="256" r:id="rId2"/>
-    <p:sldId id="257" r:id="rId3"/>
-    <p:sldId id="259" r:id="rId4"/>
-    <p:sldId id="261" r:id="rId5"/>
-    <p:sldId id="263" r:id="rId6"/>
-    <p:sldId id="264" r:id="rId7"/>
-    <p:sldId id="265" r:id="rId8"/>
-    <p:sldId id="266" r:id="rId9"/>
-    <p:sldId id="267" r:id="rId10"/>
-    <p:sldId id="268" r:id="rId11"/>
-    <p:sldId id="270" r:id="rId12"/>
-    <p:sldId id="271" r:id="rId13"/>
-    <p:sldId id="272" r:id="rId14"/>
-    <p:sldId id="273" r:id="rId15"/>
-    <p:sldId id="269" r:id="rId16"/>
-    <p:sldId id="274" r:id="rId17"/>
-    <p:sldId id="275" r:id="rId18"/>
-    <p:sldId id="276" r:id="rId19"/>
-    <p:sldId id="260" r:id="rId20"/>
+    <p:sldId id="259" r:id="rId3"/>
+    <p:sldId id="261" r:id="rId4"/>
+    <p:sldId id="263" r:id="rId5"/>
+    <p:sldId id="264" r:id="rId6"/>
+    <p:sldId id="265" r:id="rId7"/>
+    <p:sldId id="266" r:id="rId8"/>
+    <p:sldId id="267" r:id="rId9"/>
+    <p:sldId id="268" r:id="rId10"/>
+    <p:sldId id="277" r:id="rId11"/>
+    <p:sldId id="278" r:id="rId12"/>
+    <p:sldId id="279" r:id="rId13"/>
+    <p:sldId id="280" r:id="rId14"/>
+    <p:sldId id="274" r:id="rId15"/>
+    <p:sldId id="275" r:id="rId16"/>
+    <p:sldId id="276" r:id="rId17"/>
   </p:sldIdLst>
   <p:sldSz cx="12192000" cy="6858000"/>
   <p:notesSz cx="6858000" cy="9144000"/>
@@ -277,7 +274,7 @@
           <a:p>
             <a:fld id="{E8FEA837-6ACA-494E-9C40-B861434157C6}" type="datetimeFigureOut">
               <a:rPr lang="ko-KR" altLang="en-US" smtClean="0"/>
-              <a:t>2022-04-28</a:t>
+              <a:t>2022-05-12</a:t>
             </a:fld>
             <a:endParaRPr lang="ko-KR" altLang="en-US"/>
           </a:p>
@@ -475,7 +472,7 @@
           <a:p>
             <a:fld id="{E8FEA837-6ACA-494E-9C40-B861434157C6}" type="datetimeFigureOut">
               <a:rPr lang="ko-KR" altLang="en-US" smtClean="0"/>
-              <a:t>2022-04-28</a:t>
+              <a:t>2022-05-12</a:t>
             </a:fld>
             <a:endParaRPr lang="ko-KR" altLang="en-US"/>
           </a:p>
@@ -683,7 +680,7 @@
           <a:p>
             <a:fld id="{E8FEA837-6ACA-494E-9C40-B861434157C6}" type="datetimeFigureOut">
               <a:rPr lang="ko-KR" altLang="en-US" smtClean="0"/>
-              <a:t>2022-04-28</a:t>
+              <a:t>2022-05-12</a:t>
             </a:fld>
             <a:endParaRPr lang="ko-KR" altLang="en-US"/>
           </a:p>
@@ -881,7 +878,7 @@
           <a:p>
             <a:fld id="{E8FEA837-6ACA-494E-9C40-B861434157C6}" type="datetimeFigureOut">
               <a:rPr lang="ko-KR" altLang="en-US" smtClean="0"/>
-              <a:t>2022-04-28</a:t>
+              <a:t>2022-05-12</a:t>
             </a:fld>
             <a:endParaRPr lang="ko-KR" altLang="en-US"/>
           </a:p>
@@ -1156,7 +1153,7 @@
           <a:p>
             <a:fld id="{E8FEA837-6ACA-494E-9C40-B861434157C6}" type="datetimeFigureOut">
               <a:rPr lang="ko-KR" altLang="en-US" smtClean="0"/>
-              <a:t>2022-04-28</a:t>
+              <a:t>2022-05-12</a:t>
             </a:fld>
             <a:endParaRPr lang="ko-KR" altLang="en-US"/>
           </a:p>
@@ -1421,7 +1418,7 @@
           <a:p>
             <a:fld id="{E8FEA837-6ACA-494E-9C40-B861434157C6}" type="datetimeFigureOut">
               <a:rPr lang="ko-KR" altLang="en-US" smtClean="0"/>
-              <a:t>2022-04-28</a:t>
+              <a:t>2022-05-12</a:t>
             </a:fld>
             <a:endParaRPr lang="ko-KR" altLang="en-US"/>
           </a:p>
@@ -1833,7 +1830,7 @@
           <a:p>
             <a:fld id="{E8FEA837-6ACA-494E-9C40-B861434157C6}" type="datetimeFigureOut">
               <a:rPr lang="ko-KR" altLang="en-US" smtClean="0"/>
-              <a:t>2022-04-28</a:t>
+              <a:t>2022-05-12</a:t>
             </a:fld>
             <a:endParaRPr lang="ko-KR" altLang="en-US"/>
           </a:p>
@@ -1974,7 +1971,7 @@
           <a:p>
             <a:fld id="{E8FEA837-6ACA-494E-9C40-B861434157C6}" type="datetimeFigureOut">
               <a:rPr lang="ko-KR" altLang="en-US" smtClean="0"/>
-              <a:t>2022-04-28</a:t>
+              <a:t>2022-05-12</a:t>
             </a:fld>
             <a:endParaRPr lang="ko-KR" altLang="en-US"/>
           </a:p>
@@ -2087,7 +2084,7 @@
           <a:p>
             <a:fld id="{E8FEA837-6ACA-494E-9C40-B861434157C6}" type="datetimeFigureOut">
               <a:rPr lang="ko-KR" altLang="en-US" smtClean="0"/>
-              <a:t>2022-04-28</a:t>
+              <a:t>2022-05-12</a:t>
             </a:fld>
             <a:endParaRPr lang="ko-KR" altLang="en-US"/>
           </a:p>
@@ -2398,7 +2395,7 @@
           <a:p>
             <a:fld id="{E8FEA837-6ACA-494E-9C40-B861434157C6}" type="datetimeFigureOut">
               <a:rPr lang="ko-KR" altLang="en-US" smtClean="0"/>
-              <a:t>2022-04-28</a:t>
+              <a:t>2022-05-12</a:t>
             </a:fld>
             <a:endParaRPr lang="ko-KR" altLang="en-US"/>
           </a:p>
@@ -2686,7 +2683,7 @@
           <a:p>
             <a:fld id="{E8FEA837-6ACA-494E-9C40-B861434157C6}" type="datetimeFigureOut">
               <a:rPr lang="ko-KR" altLang="en-US" smtClean="0"/>
-              <a:t>2022-04-28</a:t>
+              <a:t>2022-05-12</a:t>
             </a:fld>
             <a:endParaRPr lang="ko-KR" altLang="en-US"/>
           </a:p>
@@ -2927,7 +2924,7 @@
           <a:p>
             <a:fld id="{E8FEA837-6ACA-494E-9C40-B861434157C6}" type="datetimeFigureOut">
               <a:rPr lang="ko-KR" altLang="en-US" smtClean="0"/>
-              <a:t>2022-04-28</a:t>
+              <a:t>2022-05-12</a:t>
             </a:fld>
             <a:endParaRPr lang="ko-KR" altLang="en-US"/>
           </a:p>
@@ -3443,33 +3440,56 @@
           <a:p>
             <a:r>
               <a:rPr lang="en-US" altLang="ko-KR" dirty="0"/>
-              <a:t>7. </a:t>
-            </a:r>
-            <a:r>
-              <a:rPr lang="ko-KR" altLang="en-US" dirty="0"/>
-              <a:t>아래 코드를 보시면 </a:t>
-            </a:r>
-            <a:r>
-              <a:rPr lang="en-US" altLang="ko-KR" dirty="0"/>
-              <a:t>1,2,3 </a:t>
-            </a:r>
-            <a:r>
-              <a:rPr lang="ko-KR" altLang="en-US" dirty="0"/>
-              <a:t>순서에 따라 논문들이 나열되어 있는 것을 보실 수 있습니다</a:t>
-            </a:r>
-            <a:r>
-              <a:rPr lang="en-US" altLang="ko-KR" dirty="0"/>
-              <a:t>. </a:t>
-            </a:r>
-            <a:r>
-              <a:rPr lang="ko-KR" altLang="en-US" dirty="0"/>
-              <a:t>여기 앞에 새로운 논문을 추가해보겠습니다</a:t>
+              <a:t>8. </a:t>
+            </a:r>
+            <a:r>
+              <a:rPr lang="ko-KR" altLang="en-US" dirty="0"/>
+              <a:t>우선 추가하려는 논문의 분야 </a:t>
+            </a:r>
+            <a:r>
+              <a:rPr lang="en-US" altLang="ko-KR" dirty="0" err="1"/>
+              <a:t>crtl+F</a:t>
+            </a:r>
+            <a:r>
+              <a:rPr lang="ko-KR" altLang="en-US" dirty="0"/>
+              <a:t>로 찾습니다</a:t>
+            </a:r>
+            <a:r>
+              <a:rPr lang="en-US" altLang="ko-KR" dirty="0"/>
+              <a:t>. Domestic Conference </a:t>
+            </a:r>
+            <a:r>
+              <a:rPr lang="ko-KR" altLang="en-US" dirty="0"/>
+              <a:t>에 논문을 추가해보겠습니다</a:t>
             </a:r>
             <a:r>
               <a:rPr lang="en-US" altLang="ko-KR" dirty="0"/>
               <a:t>.</a:t>
             </a:r>
-            <a:endParaRPr lang="fr-FR" altLang="ko-KR" dirty="0"/>
+            <a:r>
+              <a:rPr lang="ko-KR" altLang="en-US" dirty="0"/>
+              <a:t> 제목 문구 아래 </a:t>
+            </a:r>
+            <a:r>
+              <a:rPr lang="en-US" altLang="ko-KR" dirty="0"/>
+              <a:t>&lt;</a:t>
+            </a:r>
+            <a:r>
+              <a:rPr lang="en-US" altLang="ko-KR" dirty="0" err="1"/>
+              <a:t>ol</a:t>
+            </a:r>
+            <a:r>
+              <a:rPr lang="en-US" altLang="ko-KR" dirty="0"/>
+              <a:t>&gt;</a:t>
+            </a:r>
+            <a:r>
+              <a:rPr lang="ko-KR" altLang="en-US" dirty="0"/>
+              <a:t>이 있으면 맞게 찾은 것입니다</a:t>
+            </a:r>
+            <a:r>
+              <a:rPr lang="en-US" altLang="ko-KR" dirty="0"/>
+              <a:t>.</a:t>
+            </a:r>
           </a:p>
         </p:txBody>
       </p:sp>
@@ -3478,7 +3498,7 @@
           <p:cNvPr id="3" name="그림 2">
             <a:extLst>
               <a:ext uri="{FF2B5EF4-FFF2-40B4-BE49-F238E27FC236}">
-                <a16:creationId xmlns:a16="http://schemas.microsoft.com/office/drawing/2014/main" id="{C5E0F721-CAE4-4BC5-8E5F-A77A62812691}"/>
+                <a16:creationId xmlns:a16="http://schemas.microsoft.com/office/drawing/2014/main" id="{8C28D0BC-4BB0-9F3C-3058-6EAEE95CC61F}"/>
               </a:ext>
             </a:extLst>
           </p:cNvPr>
@@ -3495,18 +3515,70 @@
         </p:blipFill>
         <p:spPr>
           <a:xfrm>
-            <a:off x="1044450" y="1756800"/>
-            <a:ext cx="10103100" cy="4858230"/>
+            <a:off x="859834" y="1054479"/>
+            <a:ext cx="10472331" cy="5644391"/>
           </a:xfrm>
           <a:prstGeom prst="rect">
             <a:avLst/>
           </a:prstGeom>
         </p:spPr>
       </p:pic>
+      <p:sp>
+        <p:nvSpPr>
+          <p:cNvPr id="8" name="화살표: 왼쪽 7">
+            <a:extLst>
+              <a:ext uri="{FF2B5EF4-FFF2-40B4-BE49-F238E27FC236}">
+                <a16:creationId xmlns:a16="http://schemas.microsoft.com/office/drawing/2014/main" id="{512C2806-3B89-AF46-17EA-5FD79CFB23C1}"/>
+              </a:ext>
+            </a:extLst>
+          </p:cNvPr>
+          <p:cNvSpPr/>
+          <p:nvPr/>
+        </p:nvSpPr>
+        <p:spPr>
+          <a:xfrm rot="9067827">
+            <a:off x="2175353" y="3372303"/>
+            <a:ext cx="2380343" cy="1008743"/>
+          </a:xfrm>
+          <a:prstGeom prst="leftArrow">
+            <a:avLst/>
+          </a:prstGeom>
+          <a:solidFill>
+            <a:srgbClr val="FF0000"/>
+          </a:solidFill>
+          <a:ln>
+            <a:noFill/>
+          </a:ln>
+        </p:spPr>
+        <p:style>
+          <a:lnRef idx="2">
+            <a:schemeClr val="accent1">
+              <a:shade val="50000"/>
+            </a:schemeClr>
+          </a:lnRef>
+          <a:fillRef idx="1">
+            <a:schemeClr val="accent1"/>
+          </a:fillRef>
+          <a:effectRef idx="0">
+            <a:schemeClr val="accent1"/>
+          </a:effectRef>
+          <a:fontRef idx="minor">
+            <a:schemeClr val="lt1"/>
+          </a:fontRef>
+        </p:style>
+        <p:txBody>
+          <a:bodyPr rtlCol="0" anchor="ctr"/>
+          <a:lstStyle/>
+          <a:p>
+            <a:pPr algn="ctr"/>
+            <a:endParaRPr lang="ko-KR" altLang="en-US" dirty="0"/>
+          </a:p>
+        </p:txBody>
+      </p:sp>
     </p:spTree>
     <p:extLst>
       <p:ext uri="{BB962C8B-B14F-4D97-AF65-F5344CB8AC3E}">
-        <p14:creationId xmlns:p14="http://schemas.microsoft.com/office/powerpoint/2010/main" val="3816512317"/>
+        <p14:creationId xmlns:p14="http://schemas.microsoft.com/office/powerpoint/2010/main" val="3637294452"/>
       </p:ext>
     </p:extLst>
   </p:cSld>
@@ -3533,70 +3605,12 @@
           <a:chExt cx="0" cy="0"/>
         </a:xfrm>
       </p:grpSpPr>
-      <p:sp>
-        <p:nvSpPr>
-          <p:cNvPr id="4" name="TextBox 3">
-            <a:extLst>
-              <a:ext uri="{FF2B5EF4-FFF2-40B4-BE49-F238E27FC236}">
-                <a16:creationId xmlns:a16="http://schemas.microsoft.com/office/drawing/2014/main" id="{BFADF8CE-1337-48D6-BD81-D19E12B2095B}"/>
-              </a:ext>
-            </a:extLst>
-          </p:cNvPr>
-          <p:cNvSpPr txBox="1"/>
-          <p:nvPr/>
-        </p:nvSpPr>
-        <p:spPr>
-          <a:xfrm>
-            <a:off x="553927" y="437882"/>
-            <a:ext cx="11539335" cy="646331"/>
-          </a:xfrm>
-          <a:prstGeom prst="rect">
-            <a:avLst/>
-          </a:prstGeom>
-          <a:noFill/>
-        </p:spPr>
-        <p:txBody>
-          <a:bodyPr wrap="square" rtlCol="0">
-            <a:spAutoFit/>
-          </a:bodyPr>
-          <a:lstStyle/>
-          <a:p>
-            <a:r>
-              <a:rPr lang="en-US" altLang="ko-KR" dirty="0"/>
-              <a:t>8. </a:t>
-            </a:r>
-            <a:r>
-              <a:rPr lang="ko-KR" altLang="en-US" dirty="0"/>
-              <a:t>웹페이지에서 내용을 복사합니다</a:t>
-            </a:r>
-            <a:r>
-              <a:rPr lang="en-US" altLang="ko-KR" dirty="0"/>
-              <a:t>.</a:t>
-            </a:r>
-            <a:r>
-              <a:rPr lang="ko-KR" altLang="en-US" dirty="0"/>
-              <a:t> 지금부터 한글이나 워드 같은 프로그램을 함께 사용할 것을 </a:t>
-            </a:r>
-            <a:r>
-              <a:rPr lang="ko-KR" altLang="en-US" dirty="0" err="1"/>
-              <a:t>권장드립니다</a:t>
-            </a:r>
-            <a:r>
-              <a:rPr lang="en-US" altLang="ko-KR" dirty="0"/>
-              <a:t>. </a:t>
-            </a:r>
-          </a:p>
-          <a:p>
-            <a:endParaRPr lang="fr-FR" altLang="ko-KR" dirty="0"/>
-          </a:p>
-        </p:txBody>
-      </p:sp>
       <p:pic>
         <p:nvPicPr>
           <p:cNvPr id="5" name="그림 4">
             <a:extLst>
               <a:ext uri="{FF2B5EF4-FFF2-40B4-BE49-F238E27FC236}">
-                <a16:creationId xmlns:a16="http://schemas.microsoft.com/office/drawing/2014/main" id="{86166F63-1572-441E-9D08-4C395605F1A6}"/>
+                <a16:creationId xmlns:a16="http://schemas.microsoft.com/office/drawing/2014/main" id="{477B3294-FDDC-E383-C3ED-EAB52DE12EA6}"/>
               </a:ext>
             </a:extLst>
           </p:cNvPr>
@@ -3613,8 +3627,8 @@
         </p:blipFill>
         <p:spPr>
           <a:xfrm>
-            <a:off x="397294" y="1164057"/>
-            <a:ext cx="5524645" cy="4697309"/>
+            <a:off x="472464" y="3429000"/>
+            <a:ext cx="11247072" cy="2927998"/>
           </a:xfrm>
           <a:prstGeom prst="rect">
             <a:avLst/>
@@ -3623,10 +3637,10 @@
       </p:pic>
       <p:sp>
         <p:nvSpPr>
-          <p:cNvPr id="6" name="TextBox 5">
-            <a:extLst>
-              <a:ext uri="{FF2B5EF4-FFF2-40B4-BE49-F238E27FC236}">
-                <a16:creationId xmlns:a16="http://schemas.microsoft.com/office/drawing/2014/main" id="{26EAC2F6-E541-49FF-95DD-98EF7AE32422}"/>
+          <p:cNvPr id="4" name="TextBox 3">
+            <a:extLst>
+              <a:ext uri="{FF2B5EF4-FFF2-40B4-BE49-F238E27FC236}">
+                <a16:creationId xmlns:a16="http://schemas.microsoft.com/office/drawing/2014/main" id="{BFADF8CE-1337-48D6-BD81-D19E12B2095B}"/>
               </a:ext>
             </a:extLst>
           </p:cNvPr>
@@ -3635,8 +3649,8 @@
         </p:nvSpPr>
         <p:spPr>
           <a:xfrm>
-            <a:off x="3367825" y="2511380"/>
-            <a:ext cx="1875835" cy="369332"/>
+            <a:off x="553927" y="437882"/>
+            <a:ext cx="11526456" cy="2862322"/>
           </a:xfrm>
           <a:prstGeom prst="rect">
             <a:avLst/>
@@ -3644,89 +3658,255 @@
           <a:noFill/>
         </p:spPr>
         <p:txBody>
-          <a:bodyPr wrap="none" rtlCol="0">
+          <a:bodyPr wrap="square" rtlCol="0">
             <a:spAutoFit/>
           </a:bodyPr>
           <a:lstStyle/>
           <a:p>
             <a:r>
-              <a:rPr lang="ko-KR" altLang="en-US" dirty="0"/>
-              <a:t>선택 후 </a:t>
-            </a:r>
-            <a:r>
-              <a:rPr lang="en-US" altLang="ko-KR" dirty="0"/>
-              <a:t>Ctrl + C</a:t>
-            </a:r>
-            <a:endParaRPr lang="ko-KR" altLang="en-US" dirty="0"/>
-          </a:p>
-        </p:txBody>
-      </p:sp>
-      <p:pic>
-        <p:nvPicPr>
-          <p:cNvPr id="8" name="그림 7">
-            <a:extLst>
-              <a:ext uri="{FF2B5EF4-FFF2-40B4-BE49-F238E27FC236}">
-                <a16:creationId xmlns:a16="http://schemas.microsoft.com/office/drawing/2014/main" id="{AB50F962-FF64-4C73-B0E8-E68CB764AF65}"/>
-              </a:ext>
-            </a:extLst>
-          </p:cNvPr>
-          <p:cNvPicPr>
-            <a:picLocks noChangeAspect="1"/>
-          </p:cNvPicPr>
+              <a:rPr lang="en-US" altLang="ko-KR" dirty="0"/>
+              <a:t>9. &lt;</a:t>
+            </a:r>
+            <a:r>
+              <a:rPr lang="en-US" altLang="ko-KR" dirty="0" err="1"/>
+              <a:t>ol</a:t>
+            </a:r>
+            <a:r>
+              <a:rPr lang="en-US" altLang="ko-KR" dirty="0"/>
+              <a:t>&gt; </a:t>
+            </a:r>
+            <a:r>
+              <a:rPr lang="ko-KR" altLang="en-US" dirty="0"/>
+              <a:t>이후 </a:t>
+            </a:r>
+            <a:r>
+              <a:rPr lang="en-US" altLang="ko-KR" dirty="0"/>
+              <a:t>&lt;li&gt;</a:t>
+            </a:r>
+            <a:r>
+              <a:rPr lang="ko-KR" altLang="en-US" dirty="0"/>
+              <a:t>부터 </a:t>
+            </a:r>
+            <a:r>
+              <a:rPr lang="en-US" altLang="ko-KR" dirty="0"/>
+              <a:t>&lt;/li&gt;</a:t>
+            </a:r>
+            <a:r>
+              <a:rPr lang="ko-KR" altLang="en-US" dirty="0"/>
+              <a:t>가 한 단위 입니다</a:t>
+            </a:r>
+            <a:r>
+              <a:rPr lang="en-US" altLang="ko-KR" dirty="0"/>
+              <a:t>.</a:t>
+            </a:r>
+          </a:p>
+          <a:p>
+            <a:endParaRPr lang="en-US" altLang="ko-KR" dirty="0"/>
+          </a:p>
+          <a:p>
+            <a:r>
+              <a:rPr lang="en-US" altLang="ko-KR" dirty="0"/>
+              <a:t>&lt;li&gt;</a:t>
+            </a:r>
+          </a:p>
+          <a:p>
+            <a:r>
+              <a:rPr lang="en-US" altLang="ko-KR" dirty="0"/>
+              <a:t>	</a:t>
+            </a:r>
+            <a:r>
+              <a:rPr lang="ko-KR" altLang="en-US" dirty="0"/>
+              <a:t>저자이름</a:t>
+            </a:r>
+            <a:r>
+              <a:rPr lang="en-US" altLang="ko-KR" dirty="0"/>
+              <a:t>, &lt;b&gt;”</a:t>
+            </a:r>
+            <a:r>
+              <a:rPr lang="ko-KR" altLang="en-US" dirty="0"/>
+              <a:t>논문 제목</a:t>
+            </a:r>
+            <a:r>
+              <a:rPr lang="en-US" altLang="ko-KR" dirty="0"/>
+              <a:t>“&lt;/b&gt;, </a:t>
+            </a:r>
+            <a:r>
+              <a:rPr lang="ko-KR" altLang="en-US" dirty="0"/>
+              <a:t>발행 기관명</a:t>
+            </a:r>
+            <a:r>
+              <a:rPr lang="en-US" altLang="ko-KR" dirty="0"/>
+              <a:t>, </a:t>
+            </a:r>
+            <a:r>
+              <a:rPr lang="ko-KR" altLang="en-US" dirty="0"/>
+              <a:t>쪽수</a:t>
+            </a:r>
+            <a:r>
+              <a:rPr lang="en-US" altLang="ko-KR" dirty="0"/>
+              <a:t>, </a:t>
+            </a:r>
+            <a:r>
+              <a:rPr lang="ko-KR" altLang="en-US" dirty="0"/>
+              <a:t>날짜</a:t>
+            </a:r>
+            <a:endParaRPr lang="en-US" altLang="ko-KR" dirty="0"/>
+          </a:p>
+          <a:p>
+            <a:r>
+              <a:rPr lang="en-US" altLang="ko-KR" dirty="0"/>
+              <a:t>	&lt;a </a:t>
+            </a:r>
+            <a:r>
+              <a:rPr lang="en-US" altLang="ko-KR" dirty="0" err="1"/>
+              <a:t>href</a:t>
+            </a:r>
+            <a:r>
+              <a:rPr lang="en-US" altLang="ko-KR" dirty="0"/>
+              <a:t>=“</a:t>
+            </a:r>
+            <a:r>
+              <a:rPr lang="ko-KR" altLang="en-US" dirty="0"/>
+              <a:t>추가하는 논문 파일 경로</a:t>
+            </a:r>
+            <a:r>
+              <a:rPr lang="en-US" altLang="ko-KR" dirty="0"/>
+              <a:t>“ class=“internal” title=“</a:t>
+            </a:r>
+            <a:r>
+              <a:rPr lang="ko-KR" altLang="en-US" dirty="0"/>
+              <a:t>논문제목</a:t>
+            </a:r>
+            <a:r>
+              <a:rPr lang="en-US" altLang="ko-KR" dirty="0"/>
+              <a:t>”&gt;(pdf)&lt;/a&gt;</a:t>
+            </a:r>
+          </a:p>
+          <a:p>
+            <a:r>
+              <a:rPr lang="en-US" altLang="ko-KR" dirty="0"/>
+              <a:t>&lt;/li&gt;</a:t>
+            </a:r>
+          </a:p>
+          <a:p>
+            <a:endParaRPr lang="en-US" altLang="ko-KR" dirty="0"/>
+          </a:p>
+          <a:p>
+            <a:r>
+              <a:rPr lang="ko-KR" altLang="en-US" dirty="0"/>
+              <a:t>와 같은 형식으로 위 코드에서 한글 부분에 필요한 내용을 넣어줍니다</a:t>
+            </a:r>
+            <a:r>
+              <a:rPr lang="en-US" altLang="ko-KR" dirty="0"/>
+              <a:t>. </a:t>
+            </a:r>
+            <a:r>
+              <a:rPr lang="ko-KR" altLang="en-US" dirty="0"/>
+              <a:t>그리고 기존의 코드에서 </a:t>
+            </a:r>
+            <a:r>
+              <a:rPr lang="en-US" altLang="ko-KR" dirty="0"/>
+              <a:t>&lt;</a:t>
+            </a:r>
+            <a:r>
+              <a:rPr lang="en-US" altLang="ko-KR" dirty="0" err="1"/>
+              <a:t>ol</a:t>
+            </a:r>
+            <a:r>
+              <a:rPr lang="en-US" altLang="ko-KR" dirty="0"/>
+              <a:t>&gt; </a:t>
+            </a:r>
+            <a:r>
+              <a:rPr lang="ko-KR" altLang="en-US" dirty="0"/>
+              <a:t>아래에</a:t>
+            </a:r>
+            <a:r>
+              <a:rPr lang="en-US" altLang="ko-KR" dirty="0"/>
+              <a:t>, </a:t>
+            </a:r>
+            <a:r>
+              <a:rPr lang="ko-KR" altLang="en-US" dirty="0"/>
+              <a:t>다른 </a:t>
+            </a:r>
+            <a:r>
+              <a:rPr lang="en-US" altLang="ko-KR" dirty="0"/>
+              <a:t>&lt;li&gt; </a:t>
+            </a:r>
+            <a:r>
+              <a:rPr lang="ko-KR" altLang="en-US" dirty="0"/>
+              <a:t>위에 새로 작성한 코드를 </a:t>
+            </a:r>
+            <a:r>
+              <a:rPr lang="ko-KR" altLang="en-US" dirty="0" err="1"/>
+              <a:t>붙여넣어</a:t>
+            </a:r>
+            <a:r>
+              <a:rPr lang="ko-KR" altLang="en-US" dirty="0"/>
+              <a:t> 줍니다</a:t>
+            </a:r>
+            <a:r>
+              <a:rPr lang="en-US" altLang="ko-KR" dirty="0"/>
+              <a:t>. </a:t>
+            </a:r>
+            <a:r>
+              <a:rPr lang="ko-KR" altLang="en-US" dirty="0"/>
+              <a:t>추가하는 논문 파일 경로는 다음 페이지에서 추가로 설명하겠습니다</a:t>
+            </a:r>
+            <a:r>
+              <a:rPr lang="en-US" altLang="ko-KR" dirty="0"/>
+              <a:t>.</a:t>
+            </a:r>
+          </a:p>
+        </p:txBody>
+      </p:sp>
+      <p:sp>
+        <p:nvSpPr>
+          <p:cNvPr id="8" name="화살표: 왼쪽 7">
+            <a:extLst>
+              <a:ext uri="{FF2B5EF4-FFF2-40B4-BE49-F238E27FC236}">
+                <a16:creationId xmlns:a16="http://schemas.microsoft.com/office/drawing/2014/main" id="{512C2806-3B89-AF46-17EA-5FD79CFB23C1}"/>
+              </a:ext>
+            </a:extLst>
+          </p:cNvPr>
+          <p:cNvSpPr/>
           <p:nvPr/>
-        </p:nvPicPr>
-        <p:blipFill>
-          <a:blip r:embed="rId3"/>
-          <a:stretch>
-            <a:fillRect/>
-          </a:stretch>
-        </p:blipFill>
-        <p:spPr>
-          <a:xfrm>
-            <a:off x="5541146" y="2215166"/>
-            <a:ext cx="6097577" cy="4359498"/>
-          </a:xfrm>
-          <a:prstGeom prst="rect">
+        </p:nvSpPr>
+        <p:spPr>
+          <a:xfrm rot="1716383">
+            <a:off x="1102067" y="4700226"/>
+            <a:ext cx="2380343" cy="1008743"/>
+          </a:xfrm>
+          <a:prstGeom prst="leftArrow">
             <a:avLst/>
           </a:prstGeom>
-        </p:spPr>
-      </p:pic>
-      <p:sp>
-        <p:nvSpPr>
-          <p:cNvPr id="9" name="TextBox 8">
-            <a:extLst>
-              <a:ext uri="{FF2B5EF4-FFF2-40B4-BE49-F238E27FC236}">
-                <a16:creationId xmlns:a16="http://schemas.microsoft.com/office/drawing/2014/main" id="{E2B15B6E-5B4A-4D33-9641-FDE65B2036E8}"/>
-              </a:ext>
-            </a:extLst>
-          </p:cNvPr>
-          <p:cNvSpPr txBox="1"/>
-          <p:nvPr/>
-        </p:nvSpPr>
-        <p:spPr>
-          <a:xfrm>
-            <a:off x="8497909" y="3694090"/>
-            <a:ext cx="1794081" cy="369332"/>
-          </a:xfrm>
-          <a:prstGeom prst="rect">
-            <a:avLst/>
-          </a:prstGeom>
-          <a:noFill/>
-        </p:spPr>
-        <p:txBody>
-          <a:bodyPr wrap="none" rtlCol="0">
-            <a:spAutoFit/>
-          </a:bodyPr>
-          <a:lstStyle/>
-          <a:p>
-            <a:r>
-              <a:rPr lang="ko-KR" altLang="en-US" dirty="0"/>
-              <a:t>한글에 </a:t>
-            </a:r>
-            <a:r>
-              <a:rPr lang="en-US" altLang="ko-KR" dirty="0"/>
-              <a:t>Ctrl + V</a:t>
-            </a:r>
+          <a:solidFill>
+            <a:srgbClr val="FF0000"/>
+          </a:solidFill>
+          <a:ln>
+            <a:noFill/>
+          </a:ln>
+        </p:spPr>
+        <p:style>
+          <a:lnRef idx="2">
+            <a:schemeClr val="accent1">
+              <a:shade val="50000"/>
+            </a:schemeClr>
+          </a:lnRef>
+          <a:fillRef idx="1">
+            <a:schemeClr val="accent1"/>
+          </a:fillRef>
+          <a:effectRef idx="0">
+            <a:schemeClr val="accent1"/>
+          </a:effectRef>
+          <a:fontRef idx="minor">
+            <a:schemeClr val="lt1"/>
+          </a:fontRef>
+        </p:style>
+        <p:txBody>
+          <a:bodyPr rtlCol="0" anchor="ctr"/>
+          <a:lstStyle/>
+          <a:p>
+            <a:pPr algn="ctr"/>
             <a:endParaRPr lang="ko-KR" altLang="en-US" dirty="0"/>
           </a:p>
         </p:txBody>
@@ -3734,7 +3914,7 @@
     </p:spTree>
     <p:extLst>
       <p:ext uri="{BB962C8B-B14F-4D97-AF65-F5344CB8AC3E}">
-        <p14:creationId xmlns:p14="http://schemas.microsoft.com/office/powerpoint/2010/main" val="959079654"/>
+        <p14:creationId xmlns:p14="http://schemas.microsoft.com/office/powerpoint/2010/main" val="3826198494"/>
       </p:ext>
     </p:extLst>
   </p:cSld>
@@ -3776,7 +3956,7 @@
         <p:spPr>
           <a:xfrm>
             <a:off x="553927" y="437882"/>
-            <a:ext cx="11539335" cy="1477328"/>
+            <a:ext cx="11526456" cy="1477328"/>
           </a:xfrm>
           <a:prstGeom prst="rect">
             <a:avLst/>
@@ -3791,11 +3971,27 @@
           <a:p>
             <a:r>
               <a:rPr lang="en-US" altLang="ko-KR" dirty="0"/>
-              <a:t>9. </a:t>
-            </a:r>
-            <a:r>
-              <a:rPr lang="ko-KR" altLang="en-US" dirty="0"/>
-              <a:t>논문을 추가할 경우 다음과 같은 형식으로 적어줍니다</a:t>
+              <a:t>10. </a:t>
+            </a:r>
+            <a:r>
+              <a:rPr lang="ko-KR" altLang="en-US" dirty="0"/>
+              <a:t>새로운 파일을 추가하는 방법을 알려드리겠습니다</a:t>
+            </a:r>
+            <a:r>
+              <a:rPr lang="en-US" altLang="ko-KR" dirty="0"/>
+              <a:t>. 5</a:t>
+            </a:r>
+            <a:r>
+              <a:rPr lang="ko-KR" altLang="en-US" dirty="0"/>
+              <a:t>번 단계에서 </a:t>
+            </a:r>
+            <a:r>
+              <a:rPr lang="en-US" altLang="ko-KR" dirty="0"/>
+              <a:t>publication </a:t>
+            </a:r>
+            <a:r>
+              <a:rPr lang="ko-KR" altLang="en-US" dirty="0"/>
+              <a:t>경로로 들어가 주세요</a:t>
             </a:r>
             <a:r>
               <a:rPr lang="en-US" altLang="ko-KR" dirty="0"/>
@@ -3804,20 +4000,48 @@
           </a:p>
           <a:p>
             <a:r>
-              <a:rPr lang="en-US" altLang="ko-KR" dirty="0"/>
-              <a:t>**</a:t>
-            </a:r>
-            <a:r>
-              <a:rPr lang="ko-KR" altLang="en-US" dirty="0"/>
-              <a:t>을 양쪽에 추가하는 것은 </a:t>
-            </a:r>
-            <a:r>
-              <a:rPr lang="en-US" altLang="ko-KR" dirty="0"/>
-              <a:t>Bold</a:t>
-            </a:r>
-            <a:r>
-              <a:rPr lang="ko-KR" altLang="en-US" dirty="0"/>
-              <a:t>와 같습니다</a:t>
+              <a:rPr lang="ko-KR" altLang="en-US" dirty="0"/>
+              <a:t>오른쪽 위에 </a:t>
+            </a:r>
+            <a:r>
+              <a:rPr lang="en-US" altLang="ko-KR" dirty="0"/>
+              <a:t>Add file</a:t>
+            </a:r>
+            <a:r>
+              <a:rPr lang="ko-KR" altLang="en-US" dirty="0"/>
+              <a:t>이 있습니다</a:t>
+            </a:r>
+            <a:r>
+              <a:rPr lang="en-US" altLang="ko-KR" dirty="0"/>
+              <a:t>. </a:t>
+            </a:r>
+            <a:r>
+              <a:rPr lang="ko-KR" altLang="en-US" dirty="0"/>
+              <a:t>여기서 </a:t>
+            </a:r>
+            <a:r>
+              <a:rPr lang="en-US" altLang="ko-KR" dirty="0"/>
+              <a:t>Upload files</a:t>
+            </a:r>
+            <a:r>
+              <a:rPr lang="ko-KR" altLang="en-US" dirty="0"/>
+              <a:t>을 합니다</a:t>
+            </a:r>
+            <a:r>
+              <a:rPr lang="en-US" altLang="ko-KR" dirty="0"/>
+              <a:t>. </a:t>
+            </a:r>
+            <a:r>
+              <a:rPr lang="ko-KR" altLang="en-US" dirty="0"/>
+              <a:t>들어가서 파일을 올리고 맨 아래에 있는 초록색 </a:t>
+            </a:r>
+            <a:r>
+              <a:rPr lang="en-US" altLang="ko-KR" dirty="0"/>
+              <a:t>commit changes</a:t>
+            </a:r>
+            <a:r>
+              <a:rPr lang="ko-KR" altLang="en-US" dirty="0"/>
+              <a:t>를 눌러 파일을 추가합니다</a:t>
             </a:r>
             <a:r>
               <a:rPr lang="en-US" altLang="ko-KR" dirty="0"/>
@@ -3826,28 +4050,24 @@
           </a:p>
           <a:p>
             <a:r>
-              <a:rPr lang="en-US" altLang="ko-KR" dirty="0"/>
-              <a:t>[</a:t>
-            </a:r>
-            <a:r>
-              <a:rPr lang="ko-KR" altLang="en-US" dirty="0"/>
-              <a:t>링크를 넣고자 하는 텍스트</a:t>
-            </a:r>
-            <a:r>
-              <a:rPr lang="en-US" altLang="ko-KR" dirty="0"/>
-              <a:t>](</a:t>
-            </a:r>
-            <a:r>
-              <a:rPr lang="ko-KR" altLang="en-US" dirty="0"/>
-              <a:t>추가할 링크</a:t>
-            </a:r>
-            <a:r>
-              <a:rPr lang="en-US" altLang="ko-KR" dirty="0"/>
-              <a:t>) </a:t>
-            </a:r>
-            <a:r>
-              <a:rPr lang="ko-KR" altLang="en-US" dirty="0"/>
-              <a:t>와 같은 형식은 텍스트에 링크를 걸어줍니다</a:t>
+              <a:rPr lang="ko-KR" altLang="en-US" dirty="0"/>
+              <a:t>이제 새로운 파일의 경로는 </a:t>
+            </a:r>
+            <a:r>
+              <a:rPr lang="en-US" altLang="ko-KR" dirty="0"/>
+              <a:t>/publication/</a:t>
+            </a:r>
+            <a:r>
+              <a:rPr lang="ko-KR" altLang="en-US" dirty="0"/>
+              <a:t>파일이름</a:t>
+            </a:r>
+            <a:r>
+              <a:rPr lang="en-US" altLang="ko-KR" dirty="0"/>
+              <a:t>.pdf </a:t>
+            </a:r>
+            <a:r>
+              <a:rPr lang="ko-KR" altLang="en-US" dirty="0"/>
+              <a:t>입니다</a:t>
             </a:r>
             <a:r>
               <a:rPr lang="en-US" altLang="ko-KR" dirty="0"/>
@@ -3855,129 +4075,191 @@
             </a:r>
             <a:r>
               <a:rPr lang="ko-KR" altLang="en-US" dirty="0"/>
-              <a:t>아래 예시에서는 </a:t>
-            </a:r>
-            <a:r>
-              <a:rPr lang="en-US" altLang="ko-KR" dirty="0"/>
-              <a:t>pdf </a:t>
-            </a:r>
-            <a:r>
-              <a:rPr lang="ko-KR" altLang="en-US" dirty="0"/>
-              <a:t>라는 텍스트에 아래 경로와 같은 파일을 링크하는 것입니다</a:t>
-            </a:r>
-            <a:r>
-              <a:rPr lang="en-US" altLang="ko-KR" dirty="0"/>
-              <a:t>. </a:t>
-            </a:r>
-            <a:r>
-              <a:rPr lang="ko-KR" altLang="en-US" dirty="0"/>
-              <a:t>파일을 업로드하는 것은 다음 쪽에서 설명하겠습니다</a:t>
+              <a:t>파일이름을 정확히 적어서 </a:t>
+            </a:r>
+            <a:r>
+              <a:rPr lang="en-US" altLang="ko-KR" dirty="0"/>
+              <a:t>9</a:t>
+            </a:r>
+            <a:r>
+              <a:rPr lang="ko-KR" altLang="en-US" dirty="0"/>
+              <a:t>번 단계에 넣으면 됩니다</a:t>
             </a:r>
             <a:r>
               <a:rPr lang="en-US" altLang="ko-KR" dirty="0"/>
               <a:t>.</a:t>
             </a:r>
-            <a:endParaRPr lang="fr-FR" altLang="ko-KR" dirty="0"/>
-          </a:p>
-        </p:txBody>
-      </p:sp>
-      <p:sp>
-        <p:nvSpPr>
-          <p:cNvPr id="10" name="TextBox 9">
-            <a:extLst>
-              <a:ext uri="{FF2B5EF4-FFF2-40B4-BE49-F238E27FC236}">
-                <a16:creationId xmlns:a16="http://schemas.microsoft.com/office/drawing/2014/main" id="{F271370C-2056-46D8-AA18-94732B93A550}"/>
-              </a:ext>
-            </a:extLst>
-          </p:cNvPr>
-          <p:cNvSpPr txBox="1"/>
+          </a:p>
+        </p:txBody>
+      </p:sp>
+      <p:pic>
+        <p:nvPicPr>
+          <p:cNvPr id="7" name="그림 6">
+            <a:extLst>
+              <a:ext uri="{FF2B5EF4-FFF2-40B4-BE49-F238E27FC236}">
+                <a16:creationId xmlns:a16="http://schemas.microsoft.com/office/drawing/2014/main" id="{767A9EE2-8D10-107B-D0E7-4B13B45AB8ED}"/>
+              </a:ext>
+            </a:extLst>
+          </p:cNvPr>
+          <p:cNvPicPr>
+            <a:picLocks noChangeAspect="1"/>
+          </p:cNvPicPr>
           <p:nvPr/>
-        </p:nvSpPr>
+        </p:nvPicPr>
+        <p:blipFill>
+          <a:blip r:embed="rId2"/>
+          <a:stretch>
+            <a:fillRect/>
+          </a:stretch>
+        </p:blipFill>
         <p:spPr>
           <a:xfrm>
-            <a:off x="761463" y="2457632"/>
-            <a:ext cx="9560953" cy="1360116"/>
+            <a:off x="1819275" y="1982285"/>
+            <a:ext cx="8705850" cy="2435420"/>
           </a:xfrm>
           <a:prstGeom prst="rect">
             <a:avLst/>
           </a:prstGeom>
-          <a:noFill/>
-        </p:spPr>
-        <p:txBody>
-          <a:bodyPr wrap="square">
-            <a:spAutoFit/>
-          </a:bodyPr>
-          <a:lstStyle/>
-          <a:p>
-            <a:pPr marL="0" marR="0" indent="0" algn="just" fontAlgn="base" latinLnBrk="1">
-              <a:lnSpc>
-                <a:spcPct val="160000"/>
-              </a:lnSpc>
-              <a:spcBef>
-                <a:spcPts val="0"/>
-              </a:spcBef>
-              <a:spcAft>
-                <a:spcPts val="0"/>
-              </a:spcAft>
-            </a:pPr>
-            <a:r>
-              <a:rPr lang="en-US" altLang="ko-KR" sz="1800" kern="0" spc="0" dirty="0" err="1">
-                <a:solidFill>
-                  <a:srgbClr val="000000"/>
-                </a:solidFill>
-                <a:effectLst/>
-                <a:latin typeface="함초롬바탕" panose="02030604000101010101" pitchFamily="18" charset="-127"/>
-                <a:ea typeface="함초롬바탕" panose="02030604000101010101" pitchFamily="18" charset="-127"/>
-              </a:rPr>
-              <a:t>Hyoung-Joo</a:t>
-            </a:r>
-            <a:r>
-              <a:rPr lang="en-US" altLang="ko-KR" sz="1800" kern="0" spc="0" dirty="0">
-                <a:solidFill>
-                  <a:srgbClr val="000000"/>
-                </a:solidFill>
-                <a:effectLst/>
-                <a:latin typeface="함초롬바탕" panose="02030604000101010101" pitchFamily="18" charset="-127"/>
-                <a:ea typeface="함초롬바탕" panose="02030604000101010101" pitchFamily="18" charset="-127"/>
-              </a:rPr>
-              <a:t> Kim, **"How to edit pages by </a:t>
-            </a:r>
-            <a:r>
-              <a:rPr lang="en-US" altLang="ko-KR" sz="1800" kern="0" spc="0" dirty="0" err="1">
-                <a:solidFill>
-                  <a:srgbClr val="000000"/>
-                </a:solidFill>
-                <a:effectLst/>
-                <a:latin typeface="함초롬바탕" panose="02030604000101010101" pitchFamily="18" charset="-127"/>
-                <a:ea typeface="함초롬바탕" panose="02030604000101010101" pitchFamily="18" charset="-127"/>
-              </a:rPr>
-              <a:t>github</a:t>
-            </a:r>
-            <a:r>
-              <a:rPr lang="en-US" altLang="ko-KR" sz="1800" kern="0" spc="0" dirty="0">
-                <a:solidFill>
-                  <a:srgbClr val="000000"/>
-                </a:solidFill>
-                <a:effectLst/>
-                <a:latin typeface="함초롬바탕" panose="02030604000101010101" pitchFamily="18" charset="-127"/>
-                <a:ea typeface="함초롬바탕" panose="02030604000101010101" pitchFamily="18" charset="-127"/>
-              </a:rPr>
-              <a:t>"**, Seoul National University, 2021 ([pdf](../images/5/55/Semantics-preserving_optimization_of_mapping_multi-column_key_constraints_for_RDB_to_RDF_transformation.pdf))</a:t>
-            </a:r>
-            <a:endParaRPr lang="en-US" altLang="ko-KR" sz="1800" kern="0" spc="0" dirty="0">
-              <a:solidFill>
-                <a:srgbClr val="000000"/>
-              </a:solidFill>
-              <a:effectLst/>
-              <a:latin typeface="함초롬바탕" panose="02030604000101010101" pitchFamily="18" charset="-127"/>
-            </a:endParaRPr>
+        </p:spPr>
+      </p:pic>
+      <p:sp>
+        <p:nvSpPr>
+          <p:cNvPr id="9" name="화살표: 왼쪽 8">
+            <a:extLst>
+              <a:ext uri="{FF2B5EF4-FFF2-40B4-BE49-F238E27FC236}">
+                <a16:creationId xmlns:a16="http://schemas.microsoft.com/office/drawing/2014/main" id="{F736EF46-48E8-6359-B965-173980402E99}"/>
+              </a:ext>
+            </a:extLst>
+          </p:cNvPr>
+          <p:cNvSpPr/>
+          <p:nvPr/>
+        </p:nvSpPr>
+        <p:spPr>
+          <a:xfrm rot="11533890">
+            <a:off x="6664667" y="2503679"/>
+            <a:ext cx="2380343" cy="1008743"/>
+          </a:xfrm>
+          <a:prstGeom prst="leftArrow">
+            <a:avLst/>
+          </a:prstGeom>
+          <a:solidFill>
+            <a:srgbClr val="FF0000"/>
+          </a:solidFill>
+          <a:ln>
+            <a:noFill/>
+          </a:ln>
+        </p:spPr>
+        <p:style>
+          <a:lnRef idx="2">
+            <a:schemeClr val="accent1">
+              <a:shade val="50000"/>
+            </a:schemeClr>
+          </a:lnRef>
+          <a:fillRef idx="1">
+            <a:schemeClr val="accent1"/>
+          </a:fillRef>
+          <a:effectRef idx="0">
+            <a:schemeClr val="accent1"/>
+          </a:effectRef>
+          <a:fontRef idx="minor">
+            <a:schemeClr val="lt1"/>
+          </a:fontRef>
+        </p:style>
+        <p:txBody>
+          <a:bodyPr rtlCol="0" anchor="ctr"/>
+          <a:lstStyle/>
+          <a:p>
+            <a:pPr algn="ctr"/>
+            <a:endParaRPr lang="ko-KR" altLang="en-US" dirty="0"/>
+          </a:p>
+        </p:txBody>
+      </p:sp>
+      <p:pic>
+        <p:nvPicPr>
+          <p:cNvPr id="10" name="그림 9">
+            <a:extLst>
+              <a:ext uri="{FF2B5EF4-FFF2-40B4-BE49-F238E27FC236}">
+                <a16:creationId xmlns:a16="http://schemas.microsoft.com/office/drawing/2014/main" id="{8517E7D5-BBF3-40C3-04BB-2687F306A361}"/>
+              </a:ext>
+            </a:extLst>
+          </p:cNvPr>
+          <p:cNvPicPr>
+            <a:picLocks noChangeAspect="1"/>
+          </p:cNvPicPr>
+          <p:nvPr/>
+        </p:nvPicPr>
+        <p:blipFill>
+          <a:blip r:embed="rId3"/>
+          <a:stretch>
+            <a:fillRect/>
+          </a:stretch>
+        </p:blipFill>
+        <p:spPr>
+          <a:xfrm>
+            <a:off x="2989398" y="4238222"/>
+            <a:ext cx="5459278" cy="2619778"/>
+          </a:xfrm>
+          <a:prstGeom prst="rect">
+            <a:avLst/>
+          </a:prstGeom>
+        </p:spPr>
+      </p:pic>
+      <p:sp>
+        <p:nvSpPr>
+          <p:cNvPr id="11" name="화살표: 왼쪽 10">
+            <a:extLst>
+              <a:ext uri="{FF2B5EF4-FFF2-40B4-BE49-F238E27FC236}">
+                <a16:creationId xmlns:a16="http://schemas.microsoft.com/office/drawing/2014/main" id="{0E0F7617-E422-32B2-AB3E-FD04A6AB9B83}"/>
+              </a:ext>
+            </a:extLst>
+          </p:cNvPr>
+          <p:cNvSpPr/>
+          <p:nvPr/>
+        </p:nvSpPr>
+        <p:spPr>
+          <a:xfrm rot="19341625">
+            <a:off x="3731553" y="5043740"/>
+            <a:ext cx="2380343" cy="1008743"/>
+          </a:xfrm>
+          <a:prstGeom prst="leftArrow">
+            <a:avLst/>
+          </a:prstGeom>
+          <a:solidFill>
+            <a:srgbClr val="FF0000"/>
+          </a:solidFill>
+          <a:ln>
+            <a:noFill/>
+          </a:ln>
+        </p:spPr>
+        <p:style>
+          <a:lnRef idx="2">
+            <a:schemeClr val="accent1">
+              <a:shade val="50000"/>
+            </a:schemeClr>
+          </a:lnRef>
+          <a:fillRef idx="1">
+            <a:schemeClr val="accent1"/>
+          </a:fillRef>
+          <a:effectRef idx="0">
+            <a:schemeClr val="accent1"/>
+          </a:effectRef>
+          <a:fontRef idx="minor">
+            <a:schemeClr val="lt1"/>
+          </a:fontRef>
+        </p:style>
+        <p:txBody>
+          <a:bodyPr rtlCol="0" anchor="ctr"/>
+          <a:lstStyle/>
+          <a:p>
+            <a:pPr algn="ctr"/>
+            <a:endParaRPr lang="ko-KR" altLang="en-US" dirty="0"/>
           </a:p>
         </p:txBody>
       </p:sp>
     </p:spTree>
     <p:extLst>
       <p:ext uri="{BB962C8B-B14F-4D97-AF65-F5344CB8AC3E}">
-        <p14:creationId xmlns:p14="http://schemas.microsoft.com/office/powerpoint/2010/main" val="1054083577"/>
+        <p14:creationId xmlns:p14="http://schemas.microsoft.com/office/powerpoint/2010/main" val="2036008872"/>
       </p:ext>
     </p:extLst>
   </p:cSld>
@@ -4019,7 +4301,7 @@
         <p:spPr>
           <a:xfrm>
             <a:off x="553927" y="437882"/>
-            <a:ext cx="11539335" cy="1200329"/>
+            <a:ext cx="11526456" cy="369332"/>
           </a:xfrm>
           <a:prstGeom prst="rect">
             <a:avLst/>
@@ -4034,156 +4316,31 @@
           <a:p>
             <a:r>
               <a:rPr lang="en-US" altLang="ko-KR" dirty="0"/>
-              <a:t>10. </a:t>
-            </a:r>
-            <a:r>
-              <a:rPr lang="ko-KR" altLang="en-US" dirty="0"/>
-              <a:t>파일 추가와 경로에 대해 얘기해보겠습니다</a:t>
-            </a:r>
-            <a:r>
-              <a:rPr lang="en-US" altLang="ko-KR" dirty="0"/>
-              <a:t>. repository </a:t>
-            </a:r>
-            <a:r>
-              <a:rPr lang="ko-KR" altLang="en-US" dirty="0"/>
-              <a:t>페이지에서 </a:t>
-            </a:r>
-            <a:r>
-              <a:rPr lang="en-US" altLang="ko-KR" dirty="0"/>
-              <a:t>Add file &gt; Upload file </a:t>
-            </a:r>
-            <a:r>
-              <a:rPr lang="ko-KR" altLang="en-US" dirty="0"/>
-              <a:t>을 선택하여 파일을 추가할 수 있습니다</a:t>
-            </a:r>
-            <a:r>
-              <a:rPr lang="en-US" altLang="ko-KR" dirty="0"/>
-              <a:t>. </a:t>
-            </a:r>
-            <a:r>
-              <a:rPr lang="ko-KR" altLang="en-US" dirty="0"/>
-              <a:t>헷갈리지 않도록 특정 폴더에 들어가셔서 </a:t>
-            </a:r>
-            <a:r>
-              <a:rPr lang="en-US" altLang="ko-KR" dirty="0"/>
-              <a:t>Add file</a:t>
-            </a:r>
-            <a:r>
-              <a:rPr lang="ko-KR" altLang="en-US" dirty="0"/>
-              <a:t>을 하시는 것이 좋을 것입니다</a:t>
-            </a:r>
-            <a:r>
-              <a:rPr lang="en-US" altLang="ko-KR" dirty="0"/>
-              <a:t>. ‘</a:t>
-            </a:r>
-            <a:r>
-              <a:rPr lang="en-US" altLang="ko-KR" dirty="0" err="1"/>
-              <a:t>new_publication</a:t>
-            </a:r>
-            <a:r>
-              <a:rPr lang="en-US" altLang="ko-KR" dirty="0"/>
-              <a:t>’</a:t>
-            </a:r>
-            <a:r>
-              <a:rPr lang="ko-KR" altLang="en-US" dirty="0"/>
-              <a:t>이라는 폴더를 만들어 놓도록 하겠습니다</a:t>
+              <a:t>11. </a:t>
+            </a:r>
+            <a:r>
+              <a:rPr lang="ko-KR" altLang="en-US" dirty="0"/>
+              <a:t>이제 </a:t>
+            </a:r>
+            <a:r>
+              <a:rPr lang="en-US" altLang="ko-KR" dirty="0"/>
+              <a:t>9</a:t>
+            </a:r>
+            <a:r>
+              <a:rPr lang="ko-KR" altLang="en-US" dirty="0"/>
+              <a:t>번 단계에서 작성한 코드를 잘 붙여 넣어줍니다</a:t>
             </a:r>
             <a:r>
               <a:rPr lang="en-US" altLang="ko-KR" dirty="0"/>
               <a:t>.</a:t>
             </a:r>
-          </a:p>
-          <a:p>
-            <a:endParaRPr lang="en-US" altLang="ko-KR" dirty="0"/>
-          </a:p>
-        </p:txBody>
-      </p:sp>
-      <p:pic>
-        <p:nvPicPr>
-          <p:cNvPr id="5" name="그림 4">
-            <a:extLst>
-              <a:ext uri="{FF2B5EF4-FFF2-40B4-BE49-F238E27FC236}">
-                <a16:creationId xmlns:a16="http://schemas.microsoft.com/office/drawing/2014/main" id="{BA1CB324-8DFA-458A-8BE5-46743A81559B}"/>
-              </a:ext>
-            </a:extLst>
-          </p:cNvPr>
-          <p:cNvPicPr>
-            <a:picLocks noChangeAspect="1"/>
-          </p:cNvPicPr>
-          <p:nvPr/>
-        </p:nvPicPr>
-        <p:blipFill>
-          <a:blip r:embed="rId2"/>
-          <a:stretch>
-            <a:fillRect/>
-          </a:stretch>
-        </p:blipFill>
-        <p:spPr>
-          <a:xfrm>
-            <a:off x="1434071" y="1569281"/>
-            <a:ext cx="9323858" cy="4762625"/>
-          </a:xfrm>
-          <a:prstGeom prst="rect">
-            <a:avLst/>
-          </a:prstGeom>
-        </p:spPr>
-      </p:pic>
-      <p:sp>
-        <p:nvSpPr>
-          <p:cNvPr id="6" name="화살표: 왼쪽 5">
-            <a:extLst>
-              <a:ext uri="{FF2B5EF4-FFF2-40B4-BE49-F238E27FC236}">
-                <a16:creationId xmlns:a16="http://schemas.microsoft.com/office/drawing/2014/main" id="{A5E0F9EB-3F80-4282-A27D-B2E3B67D4E42}"/>
-              </a:ext>
-            </a:extLst>
-          </p:cNvPr>
-          <p:cNvSpPr/>
-          <p:nvPr/>
-        </p:nvSpPr>
-        <p:spPr>
-          <a:xfrm rot="9067827">
-            <a:off x="4994891" y="2848234"/>
-            <a:ext cx="2380343" cy="1008743"/>
-          </a:xfrm>
-          <a:prstGeom prst="leftArrow">
-            <a:avLst/>
-          </a:prstGeom>
-          <a:solidFill>
-            <a:srgbClr val="FF0000"/>
-          </a:solidFill>
-          <a:ln>
-            <a:noFill/>
-          </a:ln>
-        </p:spPr>
-        <p:style>
-          <a:lnRef idx="2">
-            <a:schemeClr val="accent1">
-              <a:shade val="50000"/>
-            </a:schemeClr>
-          </a:lnRef>
-          <a:fillRef idx="1">
-            <a:schemeClr val="accent1"/>
-          </a:fillRef>
-          <a:effectRef idx="0">
-            <a:schemeClr val="accent1"/>
-          </a:effectRef>
-          <a:fontRef idx="minor">
-            <a:schemeClr val="lt1"/>
-          </a:fontRef>
-        </p:style>
-        <p:txBody>
-          <a:bodyPr rtlCol="0" anchor="ctr"/>
-          <a:lstStyle/>
-          <a:p>
-            <a:pPr algn="ctr"/>
-            <a:endParaRPr lang="ko-KR" altLang="en-US" dirty="0"/>
           </a:p>
         </p:txBody>
       </p:sp>
     </p:spTree>
     <p:extLst>
       <p:ext uri="{BB962C8B-B14F-4D97-AF65-F5344CB8AC3E}">
-        <p14:creationId xmlns:p14="http://schemas.microsoft.com/office/powerpoint/2010/main" val="1965124669"/>
+        <p14:creationId xmlns:p14="http://schemas.microsoft.com/office/powerpoint/2010/main" val="3469850789"/>
       </p:ext>
     </p:extLst>
   </p:cSld>
@@ -4224,8 +4381,8 @@
         </p:nvSpPr>
         <p:spPr>
           <a:xfrm>
-            <a:off x="553927" y="437882"/>
-            <a:ext cx="11539335" cy="1477328"/>
+            <a:off x="553926" y="437882"/>
+            <a:ext cx="11468501" cy="646331"/>
           </a:xfrm>
           <a:prstGeom prst="rect">
             <a:avLst/>
@@ -4240,91 +4397,19 @@
           <a:p>
             <a:r>
               <a:rPr lang="en-US" altLang="ko-KR" dirty="0"/>
-              <a:t>10-2. </a:t>
-            </a:r>
-            <a:r>
-              <a:rPr lang="ko-KR" altLang="en-US" dirty="0"/>
-              <a:t>파일 경로에 대해서 추가적으로 설명하겠습니다</a:t>
-            </a:r>
-            <a:r>
-              <a:rPr lang="en-US" altLang="ko-KR" dirty="0"/>
-              <a:t>. </a:t>
-            </a:r>
-            <a:r>
-              <a:rPr lang="ko-KR" altLang="en-US" dirty="0"/>
-              <a:t>앞서 지금 수정하고자 하는 페이지가 </a:t>
-            </a:r>
-            <a:r>
-              <a:rPr lang="en-US" altLang="ko-KR" dirty="0"/>
-              <a:t>members</a:t>
-            </a:r>
-            <a:r>
-              <a:rPr lang="ko-KR" altLang="en-US" dirty="0"/>
-              <a:t>라는 폴더 안에 있음을 확인했습니다</a:t>
-            </a:r>
-            <a:r>
-              <a:rPr lang="en-US" altLang="ko-KR" dirty="0"/>
-              <a:t>. images</a:t>
-            </a:r>
-            <a:r>
-              <a:rPr lang="ko-KR" altLang="en-US" dirty="0"/>
-              <a:t>는 </a:t>
-            </a:r>
-            <a:r>
-              <a:rPr lang="en-US" altLang="ko-KR" dirty="0"/>
-              <a:t>members</a:t>
-            </a:r>
-            <a:r>
-              <a:rPr lang="ko-KR" altLang="en-US" dirty="0"/>
-              <a:t>와 같은 계층에 있는 폴더 입니다</a:t>
-            </a:r>
-            <a:r>
-              <a:rPr lang="en-US" altLang="ko-KR" dirty="0"/>
-              <a:t>. ( )</a:t>
-            </a:r>
-            <a:r>
-              <a:rPr lang="ko-KR" altLang="en-US" dirty="0"/>
-              <a:t>안 링크의 시작이 </a:t>
-            </a:r>
-            <a:r>
-              <a:rPr lang="en-US" altLang="ko-KR" dirty="0"/>
-              <a:t>.. </a:t>
-            </a:r>
-            <a:r>
-              <a:rPr lang="ko-KR" altLang="en-US" dirty="0"/>
-              <a:t>으로 시작하는데</a:t>
-            </a:r>
-            <a:r>
-              <a:rPr lang="en-US" altLang="ko-KR" dirty="0"/>
-              <a:t>, </a:t>
-            </a:r>
-            <a:r>
-              <a:rPr lang="ko-KR" altLang="en-US" dirty="0"/>
-              <a:t>이는 상위 디렉토리를 가리킵니다</a:t>
-            </a:r>
-            <a:r>
-              <a:rPr lang="en-US" altLang="ko-KR" dirty="0"/>
-              <a:t>. </a:t>
-            </a:r>
-            <a:r>
-              <a:rPr lang="ko-KR" altLang="en-US" dirty="0"/>
-              <a:t>즉</a:t>
-            </a:r>
-            <a:r>
-              <a:rPr lang="en-US" altLang="ko-KR" dirty="0"/>
-              <a:t>, </a:t>
-            </a:r>
-            <a:r>
-              <a:rPr lang="ko-KR" altLang="en-US" dirty="0"/>
-              <a:t>상위 디렉토리 안의 </a:t>
-            </a:r>
-            <a:r>
-              <a:rPr lang="en-US" altLang="ko-KR" dirty="0"/>
-              <a:t>images </a:t>
-            </a:r>
-            <a:r>
-              <a:rPr lang="ko-KR" altLang="en-US" dirty="0"/>
-              <a:t>폴더 안의 경로입니다</a:t>
+              <a:t>12. </a:t>
+            </a:r>
+            <a:r>
+              <a:rPr lang="ko-KR" altLang="en-US" dirty="0"/>
+              <a:t>이제 번호를 매긴 내용을 전부 복사하여  </a:t>
+            </a:r>
+            <a:r>
+              <a:rPr lang="en-US" altLang="ko-KR" dirty="0"/>
+              <a:t>7</a:t>
+            </a:r>
+            <a:r>
+              <a:rPr lang="ko-KR" altLang="en-US" dirty="0"/>
+              <a:t>번 과정에서 수정하던 파일의 같은 자리에 붙여 넣습니다</a:t>
             </a:r>
             <a:r>
               <a:rPr lang="en-US" altLang="ko-KR" dirty="0"/>
@@ -4334,148 +4419,110 @@
           <a:p>
             <a:r>
               <a:rPr lang="ko-KR" altLang="en-US" dirty="0"/>
-              <a:t>만약 새로운 논문 </a:t>
-            </a:r>
-            <a:r>
-              <a:rPr lang="en-US" altLang="ko-KR" dirty="0"/>
-              <a:t>pdf</a:t>
-            </a:r>
-            <a:r>
-              <a:rPr lang="ko-KR" altLang="en-US" dirty="0"/>
-              <a:t>파일을 </a:t>
-            </a:r>
-            <a:r>
-              <a:rPr lang="en-US" altLang="ko-KR" dirty="0" err="1"/>
-              <a:t>new_publication</a:t>
-            </a:r>
-            <a:r>
-              <a:rPr lang="en-US" altLang="ko-KR" dirty="0"/>
-              <a:t> </a:t>
-            </a:r>
-            <a:r>
-              <a:rPr lang="ko-KR" altLang="en-US" dirty="0"/>
-              <a:t>이라는 폴더에 저장해 두었다면 </a:t>
-            </a:r>
-            <a:r>
-              <a:rPr lang="en-US" altLang="ko-KR" dirty="0"/>
-              <a:t>../</a:t>
-            </a:r>
-            <a:r>
-              <a:rPr lang="en-US" altLang="ko-KR" dirty="0" err="1"/>
-              <a:t>new_publication</a:t>
-            </a:r>
-            <a:r>
-              <a:rPr lang="en-US" altLang="ko-KR" dirty="0"/>
-              <a:t>/</a:t>
-            </a:r>
-            <a:r>
-              <a:rPr lang="ko-KR" altLang="en-US" dirty="0"/>
-              <a:t>파일이름 으로 링크를 지정하면 됩니다</a:t>
-            </a:r>
-            <a:r>
-              <a:rPr lang="en-US" altLang="ko-KR" dirty="0"/>
-              <a:t>. </a:t>
-            </a:r>
-          </a:p>
-        </p:txBody>
-      </p:sp>
-      <p:sp>
-        <p:nvSpPr>
-          <p:cNvPr id="7" name="TextBox 6">
-            <a:extLst>
-              <a:ext uri="{FF2B5EF4-FFF2-40B4-BE49-F238E27FC236}">
-                <a16:creationId xmlns:a16="http://schemas.microsoft.com/office/drawing/2014/main" id="{4B976A3C-CAD1-483C-85FC-7470CE51BA79}"/>
-              </a:ext>
-            </a:extLst>
-          </p:cNvPr>
-          <p:cNvSpPr txBox="1"/>
+              <a:t>그리고 페이지의 맨 아래 초록색 버튼인 </a:t>
+            </a:r>
+            <a:r>
+              <a:rPr lang="en-US" altLang="ko-KR" dirty="0"/>
+              <a:t>Commit changes</a:t>
+            </a:r>
+            <a:r>
+              <a:rPr lang="ko-KR" altLang="en-US" dirty="0"/>
+              <a:t>를 눌러 수정을 반영합니다</a:t>
+            </a:r>
+            <a:r>
+              <a:rPr lang="en-US" altLang="ko-KR" dirty="0"/>
+              <a:t>.</a:t>
+            </a:r>
+            <a:endParaRPr lang="fr-FR" altLang="ko-KR" dirty="0"/>
+          </a:p>
+        </p:txBody>
+      </p:sp>
+      <p:pic>
+        <p:nvPicPr>
+          <p:cNvPr id="5" name="그림 4">
+            <a:extLst>
+              <a:ext uri="{FF2B5EF4-FFF2-40B4-BE49-F238E27FC236}">
+                <a16:creationId xmlns:a16="http://schemas.microsoft.com/office/drawing/2014/main" id="{AD2C6926-B205-40BA-AB63-0B2B406AA8B2}"/>
+              </a:ext>
+            </a:extLst>
+          </p:cNvPr>
+          <p:cNvPicPr>
+            <a:picLocks noChangeAspect="1"/>
+          </p:cNvPicPr>
           <p:nvPr/>
-        </p:nvSpPr>
+        </p:nvPicPr>
+        <p:blipFill>
+          <a:blip r:embed="rId2"/>
+          <a:stretch>
+            <a:fillRect/>
+          </a:stretch>
+        </p:blipFill>
         <p:spPr>
           <a:xfrm>
-            <a:off x="761463" y="2457632"/>
-            <a:ext cx="9560953" cy="1360116"/>
+            <a:off x="2275014" y="1812429"/>
+            <a:ext cx="7641971" cy="3233142"/>
           </a:xfrm>
           <a:prstGeom prst="rect">
             <a:avLst/>
           </a:prstGeom>
-          <a:noFill/>
-        </p:spPr>
-        <p:txBody>
-          <a:bodyPr wrap="square">
-            <a:spAutoFit/>
-          </a:bodyPr>
-          <a:lstStyle/>
-          <a:p>
-            <a:pPr marL="0" marR="0" indent="0" algn="just" fontAlgn="base" latinLnBrk="1">
-              <a:lnSpc>
-                <a:spcPct val="160000"/>
-              </a:lnSpc>
-              <a:spcBef>
-                <a:spcPts val="0"/>
-              </a:spcBef>
-              <a:spcAft>
-                <a:spcPts val="0"/>
-              </a:spcAft>
-            </a:pPr>
-            <a:r>
-              <a:rPr lang="en-US" altLang="ko-KR" sz="1800" kern="0" spc="0" dirty="0" err="1">
-                <a:solidFill>
-                  <a:srgbClr val="000000"/>
-                </a:solidFill>
-                <a:effectLst/>
-                <a:latin typeface="함초롬바탕" panose="02030604000101010101" pitchFamily="18" charset="-127"/>
-                <a:ea typeface="함초롬바탕" panose="02030604000101010101" pitchFamily="18" charset="-127"/>
-              </a:rPr>
-              <a:t>Hyoung-Joo</a:t>
-            </a:r>
-            <a:r>
-              <a:rPr lang="en-US" altLang="ko-KR" sz="1800" kern="0" spc="0" dirty="0">
-                <a:solidFill>
-                  <a:srgbClr val="000000"/>
-                </a:solidFill>
-                <a:effectLst/>
-                <a:latin typeface="함초롬바탕" panose="02030604000101010101" pitchFamily="18" charset="-127"/>
-                <a:ea typeface="함초롬바탕" panose="02030604000101010101" pitchFamily="18" charset="-127"/>
-              </a:rPr>
-              <a:t> Kim, **"How to edit pages by </a:t>
-            </a:r>
-            <a:r>
-              <a:rPr lang="en-US" altLang="ko-KR" sz="1800" kern="0" spc="0" dirty="0" err="1">
-                <a:solidFill>
-                  <a:srgbClr val="000000"/>
-                </a:solidFill>
-                <a:effectLst/>
-                <a:latin typeface="함초롬바탕" panose="02030604000101010101" pitchFamily="18" charset="-127"/>
-                <a:ea typeface="함초롬바탕" panose="02030604000101010101" pitchFamily="18" charset="-127"/>
-              </a:rPr>
-              <a:t>github</a:t>
-            </a:r>
-            <a:r>
-              <a:rPr lang="en-US" altLang="ko-KR" sz="1800" kern="0" spc="0" dirty="0">
-                <a:solidFill>
-                  <a:srgbClr val="000000"/>
-                </a:solidFill>
-                <a:effectLst/>
-                <a:latin typeface="함초롬바탕" panose="02030604000101010101" pitchFamily="18" charset="-127"/>
-                <a:ea typeface="함초롬바탕" panose="02030604000101010101" pitchFamily="18" charset="-127"/>
-              </a:rPr>
-              <a:t>"**, Seoul National University, 2021 ([pdf](../images/5/55/Semantics-preserving_optimization_of_mapping_multi-column_key_constraints_for_RDB_to_RDF_transformation.pdf))</a:t>
-            </a:r>
-            <a:endParaRPr lang="en-US" altLang="ko-KR" sz="1800" kern="0" spc="0" dirty="0">
-              <a:solidFill>
-                <a:srgbClr val="000000"/>
-              </a:solidFill>
-              <a:effectLst/>
-              <a:latin typeface="함초롬바탕" panose="02030604000101010101" pitchFamily="18" charset="-127"/>
-            </a:endParaRPr>
+        </p:spPr>
+      </p:pic>
+      <p:sp>
+        <p:nvSpPr>
+          <p:cNvPr id="6" name="화살표: 왼쪽 5">
+            <a:extLst>
+              <a:ext uri="{FF2B5EF4-FFF2-40B4-BE49-F238E27FC236}">
+                <a16:creationId xmlns:a16="http://schemas.microsoft.com/office/drawing/2014/main" id="{32D27459-577C-4CD0-AE12-D79ADE495D30}"/>
+              </a:ext>
+            </a:extLst>
+          </p:cNvPr>
+          <p:cNvSpPr/>
+          <p:nvPr/>
+        </p:nvSpPr>
+        <p:spPr>
+          <a:xfrm rot="19933006">
+            <a:off x="3793136" y="3373834"/>
+            <a:ext cx="2380343" cy="1008743"/>
+          </a:xfrm>
+          <a:prstGeom prst="leftArrow">
+            <a:avLst/>
+          </a:prstGeom>
+          <a:solidFill>
+            <a:srgbClr val="FF0000"/>
+          </a:solidFill>
+          <a:ln>
+            <a:noFill/>
+          </a:ln>
+        </p:spPr>
+        <p:style>
+          <a:lnRef idx="2">
+            <a:schemeClr val="accent1">
+              <a:shade val="50000"/>
+            </a:schemeClr>
+          </a:lnRef>
+          <a:fillRef idx="1">
+            <a:schemeClr val="accent1"/>
+          </a:fillRef>
+          <a:effectRef idx="0">
+            <a:schemeClr val="accent1"/>
+          </a:effectRef>
+          <a:fontRef idx="minor">
+            <a:schemeClr val="lt1"/>
+          </a:fontRef>
+        </p:style>
+        <p:txBody>
+          <a:bodyPr rtlCol="0" anchor="ctr"/>
+          <a:lstStyle/>
+          <a:p>
+            <a:pPr algn="ctr"/>
+            <a:endParaRPr lang="ko-KR" altLang="en-US" dirty="0"/>
           </a:p>
         </p:txBody>
       </p:sp>
     </p:spTree>
     <p:extLst>
       <p:ext uri="{BB962C8B-B14F-4D97-AF65-F5344CB8AC3E}">
-        <p14:creationId xmlns:p14="http://schemas.microsoft.com/office/powerpoint/2010/main" val="3337930534"/>
+        <p14:creationId xmlns:p14="http://schemas.microsoft.com/office/powerpoint/2010/main" val="2681029250"/>
       </p:ext>
     </p:extLst>
   </p:cSld>
@@ -4517,7 +4564,7 @@
         <p:spPr>
           <a:xfrm>
             <a:off x="553926" y="437882"/>
-            <a:ext cx="11468501" cy="923330"/>
+            <a:ext cx="11468501" cy="1200329"/>
           </a:xfrm>
           <a:prstGeom prst="rect">
             <a:avLst/>
@@ -4532,11 +4579,37 @@
           <a:p>
             <a:r>
               <a:rPr lang="en-US" altLang="ko-KR" dirty="0"/>
-              <a:t>11. </a:t>
-            </a:r>
-            <a:r>
-              <a:rPr lang="ko-KR" altLang="en-US" dirty="0"/>
-              <a:t>다시 한글로 돌아와 번호를 매기겠습니다</a:t>
+              <a:t>13. repository </a:t>
+            </a:r>
+            <a:r>
+              <a:rPr lang="ko-KR" altLang="en-US" dirty="0"/>
+              <a:t>화면에서 </a:t>
+            </a:r>
+            <a:r>
+              <a:rPr lang="en-US" altLang="ko-KR" dirty="0"/>
+              <a:t>Actions </a:t>
+            </a:r>
+            <a:r>
+              <a:rPr lang="ko-KR" altLang="en-US" dirty="0"/>
+              <a:t>탭을 클릭하면 현재 페이지가 만들어지고 있음을 확인하고 있습니다</a:t>
+            </a:r>
+            <a:r>
+              <a:rPr lang="en-US" altLang="ko-KR" dirty="0"/>
+              <a:t>.</a:t>
+            </a:r>
+          </a:p>
+          <a:p>
+            <a:r>
+              <a:rPr lang="ko-KR" altLang="en-US" dirty="0"/>
+              <a:t>앞의 노란색 동그라미가 초록색 체크로 바뀌면 다시 </a:t>
+            </a:r>
+            <a:r>
+              <a:rPr lang="en-US" altLang="ko-KR" dirty="0" err="1"/>
+              <a:t>url</a:t>
+            </a:r>
+            <a:r>
+              <a:rPr lang="ko-KR" altLang="en-US" dirty="0"/>
+              <a:t>로 들어가 수정이 제대로 반영되었는지 확인하시면 됩니다</a:t>
             </a:r>
             <a:r>
               <a:rPr lang="en-US" altLang="ko-KR" dirty="0"/>
@@ -4544,27 +4617,35 @@
             </a:r>
             <a:r>
               <a:rPr lang="ko-KR" altLang="en-US" dirty="0"/>
-              <a:t>한글에서 전체 선택 후 서식 </a:t>
-            </a:r>
-            <a:r>
-              <a:rPr lang="en-US" altLang="ko-KR" dirty="0"/>
-              <a:t>&gt; </a:t>
-            </a:r>
-            <a:r>
-              <a:rPr lang="ko-KR" altLang="en-US" dirty="0"/>
-              <a:t>문단 번호 매기기 를 이용하면 쉽게 번호를 매길 수 있습니다</a:t>
-            </a:r>
-            <a:r>
-              <a:rPr lang="en-US" altLang="ko-KR" dirty="0"/>
-              <a:t>. markdown</a:t>
-            </a:r>
-            <a:r>
-              <a:rPr lang="ko-KR" altLang="en-US" dirty="0"/>
-              <a:t>이라는 언어가 사용하긴 쉽지만 번호를 수동으로 매겨야 하기 때문에 이렇게 작업합니다</a:t>
+              <a:t>홈페이지에 </a:t>
+            </a:r>
+            <a:r>
+              <a:rPr lang="en-US" altLang="ko-KR" dirty="0"/>
+              <a:t>pdf, ppt </a:t>
+            </a:r>
+            <a:r>
+              <a:rPr lang="ko-KR" altLang="en-US" dirty="0"/>
+              <a:t>파일이 많고 페이지도 많기 때문에 </a:t>
+            </a:r>
+            <a:r>
+              <a:rPr lang="en-US" altLang="ko-KR" dirty="0"/>
+              <a:t>15~20</a:t>
+            </a:r>
+            <a:r>
+              <a:rPr lang="ko-KR" altLang="en-US" dirty="0"/>
+              <a:t>분 정도 걸립니다</a:t>
             </a:r>
             <a:r>
               <a:rPr lang="en-US" altLang="ko-KR" dirty="0"/>
               <a:t>. </a:t>
+            </a:r>
+            <a:r>
+              <a:rPr lang="ko-KR" altLang="en-US" dirty="0"/>
+              <a:t>홈페이지에 문제가 없는지 자동으로 검사해주는 단계입니다</a:t>
+            </a:r>
+            <a:r>
+              <a:rPr lang="en-US" altLang="ko-KR" dirty="0"/>
+              <a:t>.</a:t>
             </a:r>
             <a:endParaRPr lang="fr-FR" altLang="ko-KR" dirty="0"/>
           </a:p>
@@ -4572,10 +4653,10 @@
       </p:sp>
       <p:pic>
         <p:nvPicPr>
-          <p:cNvPr id="7" name="그림 6">
-            <a:extLst>
-              <a:ext uri="{FF2B5EF4-FFF2-40B4-BE49-F238E27FC236}">
-                <a16:creationId xmlns:a16="http://schemas.microsoft.com/office/drawing/2014/main" id="{486F121C-9ED7-4D44-878E-316443067661}"/>
+          <p:cNvPr id="5" name="그림 4">
+            <a:extLst>
+              <a:ext uri="{FF2B5EF4-FFF2-40B4-BE49-F238E27FC236}">
+                <a16:creationId xmlns:a16="http://schemas.microsoft.com/office/drawing/2014/main" id="{712555F7-BD83-4EFF-AFD8-8D235D86CCCD}"/>
               </a:ext>
             </a:extLst>
           </p:cNvPr>
@@ -4592,18 +4673,152 @@
         </p:blipFill>
         <p:spPr>
           <a:xfrm>
-            <a:off x="2201534" y="1361212"/>
-            <a:ext cx="7788932" cy="5061990"/>
+            <a:off x="1424546" y="1721681"/>
+            <a:ext cx="9323858" cy="4762625"/>
           </a:xfrm>
           <a:prstGeom prst="rect">
             <a:avLst/>
           </a:prstGeom>
         </p:spPr>
       </p:pic>
+      <p:sp>
+        <p:nvSpPr>
+          <p:cNvPr id="6" name="화살표: 왼쪽 5">
+            <a:extLst>
+              <a:ext uri="{FF2B5EF4-FFF2-40B4-BE49-F238E27FC236}">
+                <a16:creationId xmlns:a16="http://schemas.microsoft.com/office/drawing/2014/main" id="{5387F965-0724-4066-9C84-58B7E6DE8FF8}"/>
+              </a:ext>
+            </a:extLst>
+          </p:cNvPr>
+          <p:cNvSpPr/>
+          <p:nvPr/>
+        </p:nvSpPr>
+        <p:spPr>
+          <a:xfrm rot="1240871">
+            <a:off x="3796876" y="2472600"/>
+            <a:ext cx="2380343" cy="1008743"/>
+          </a:xfrm>
+          <a:prstGeom prst="leftArrow">
+            <a:avLst/>
+          </a:prstGeom>
+          <a:solidFill>
+            <a:srgbClr val="FF0000"/>
+          </a:solidFill>
+          <a:ln>
+            <a:noFill/>
+          </a:ln>
+        </p:spPr>
+        <p:style>
+          <a:lnRef idx="2">
+            <a:schemeClr val="accent1">
+              <a:shade val="50000"/>
+            </a:schemeClr>
+          </a:lnRef>
+          <a:fillRef idx="1">
+            <a:schemeClr val="accent1"/>
+          </a:fillRef>
+          <a:effectRef idx="0">
+            <a:schemeClr val="accent1"/>
+          </a:effectRef>
+          <a:fontRef idx="minor">
+            <a:schemeClr val="lt1"/>
+          </a:fontRef>
+        </p:style>
+        <p:txBody>
+          <a:bodyPr rtlCol="0" anchor="ctr"/>
+          <a:lstStyle/>
+          <a:p>
+            <a:pPr algn="ctr"/>
+            <a:endParaRPr lang="ko-KR" altLang="en-US" dirty="0"/>
+          </a:p>
+        </p:txBody>
+      </p:sp>
+      <p:pic>
+        <p:nvPicPr>
+          <p:cNvPr id="7" name="그림 6">
+            <a:extLst>
+              <a:ext uri="{FF2B5EF4-FFF2-40B4-BE49-F238E27FC236}">
+                <a16:creationId xmlns:a16="http://schemas.microsoft.com/office/drawing/2014/main" id="{45147D80-5A20-4C23-8D53-BDDE7BCC9945}"/>
+              </a:ext>
+            </a:extLst>
+          </p:cNvPr>
+          <p:cNvPicPr>
+            <a:picLocks noChangeAspect="1"/>
+          </p:cNvPicPr>
+          <p:nvPr/>
+        </p:nvPicPr>
+        <p:blipFill>
+          <a:blip r:embed="rId3"/>
+          <a:stretch>
+            <a:fillRect/>
+          </a:stretch>
+        </p:blipFill>
+        <p:spPr>
+          <a:xfrm>
+            <a:off x="3994409" y="3227515"/>
+            <a:ext cx="7043241" cy="3782885"/>
+          </a:xfrm>
+          <a:prstGeom prst="rect">
+            <a:avLst/>
+          </a:prstGeom>
+        </p:spPr>
+      </p:pic>
+      <p:sp>
+        <p:nvSpPr>
+          <p:cNvPr id="8" name="화살표: 왼쪽 7">
+            <a:extLst>
+              <a:ext uri="{FF2B5EF4-FFF2-40B4-BE49-F238E27FC236}">
+                <a16:creationId xmlns:a16="http://schemas.microsoft.com/office/drawing/2014/main" id="{44566BC8-7F3E-4A23-B157-B1EC6DEC1A84}"/>
+              </a:ext>
+            </a:extLst>
+          </p:cNvPr>
+          <p:cNvSpPr/>
+          <p:nvPr/>
+        </p:nvSpPr>
+        <p:spPr>
+          <a:xfrm rot="1240871">
+            <a:off x="5739441" y="4936747"/>
+            <a:ext cx="2380343" cy="1008743"/>
+          </a:xfrm>
+          <a:prstGeom prst="leftArrow">
+            <a:avLst/>
+          </a:prstGeom>
+          <a:solidFill>
+            <a:srgbClr val="FF0000"/>
+          </a:solidFill>
+          <a:ln>
+            <a:noFill/>
+          </a:ln>
+        </p:spPr>
+        <p:style>
+          <a:lnRef idx="2">
+            <a:schemeClr val="accent1">
+              <a:shade val="50000"/>
+            </a:schemeClr>
+          </a:lnRef>
+          <a:fillRef idx="1">
+            <a:schemeClr val="accent1"/>
+          </a:fillRef>
+          <a:effectRef idx="0">
+            <a:schemeClr val="accent1"/>
+          </a:effectRef>
+          <a:fontRef idx="minor">
+            <a:schemeClr val="lt1"/>
+          </a:fontRef>
+        </p:style>
+        <p:txBody>
+          <a:bodyPr rtlCol="0" anchor="ctr"/>
+          <a:lstStyle/>
+          <a:p>
+            <a:pPr algn="ctr"/>
+            <a:endParaRPr lang="ko-KR" altLang="en-US" dirty="0"/>
+          </a:p>
+        </p:txBody>
+      </p:sp>
     </p:spTree>
     <p:extLst>
       <p:ext uri="{BB962C8B-B14F-4D97-AF65-F5344CB8AC3E}">
-        <p14:creationId xmlns:p14="http://schemas.microsoft.com/office/powerpoint/2010/main" val="1256853840"/>
+        <p14:creationId xmlns:p14="http://schemas.microsoft.com/office/powerpoint/2010/main" val="3186227767"/>
       </p:ext>
     </p:extLst>
   </p:cSld>
@@ -4645,7 +4860,7 @@
         <p:spPr>
           <a:xfrm>
             <a:off x="553926" y="437882"/>
-            <a:ext cx="11468501" cy="646331"/>
+            <a:ext cx="11468501" cy="369332"/>
           </a:xfrm>
           <a:prstGeom prst="rect">
             <a:avLst/>
@@ -4660,37 +4875,19 @@
           <a:p>
             <a:r>
               <a:rPr lang="en-US" altLang="ko-KR" dirty="0"/>
-              <a:t>12. </a:t>
-            </a:r>
-            <a:r>
-              <a:rPr lang="ko-KR" altLang="en-US" dirty="0"/>
-              <a:t>이제 번호를 매긴 내용을 전부 복사하여  </a:t>
-            </a:r>
-            <a:r>
-              <a:rPr lang="en-US" altLang="ko-KR" dirty="0"/>
-              <a:t>7</a:t>
-            </a:r>
-            <a:r>
-              <a:rPr lang="ko-KR" altLang="en-US" dirty="0"/>
-              <a:t>번 과정에서 수정하던 파일의 같은 자리에 붙여 넣습니다</a:t>
-            </a:r>
-            <a:r>
-              <a:rPr lang="en-US" altLang="ko-KR" dirty="0"/>
-              <a:t>.</a:t>
-            </a:r>
-          </a:p>
-          <a:p>
-            <a:r>
-              <a:rPr lang="ko-KR" altLang="en-US" dirty="0"/>
-              <a:t>그리고 페이지의 맨 아래 초록색 버튼인 </a:t>
-            </a:r>
-            <a:r>
-              <a:rPr lang="en-US" altLang="ko-KR" dirty="0"/>
-              <a:t>Commit changes</a:t>
-            </a:r>
-            <a:r>
-              <a:rPr lang="ko-KR" altLang="en-US" dirty="0"/>
-              <a:t>를 눌러 수정을 반영합니다</a:t>
+              <a:t>14. </a:t>
+            </a:r>
+            <a:r>
+              <a:rPr lang="ko-KR" altLang="en-US" dirty="0"/>
+              <a:t>바뀐 결과를 확인합니다</a:t>
+            </a:r>
+            <a:r>
+              <a:rPr lang="en-US" altLang="ko-KR" dirty="0"/>
+              <a:t>. </a:t>
+            </a:r>
+            <a:r>
+              <a:rPr lang="ko-KR" altLang="en-US" dirty="0"/>
+              <a:t>결과는 아래와 다를 수 있습니다</a:t>
             </a:r>
             <a:r>
               <a:rPr lang="en-US" altLang="ko-KR" dirty="0"/>
@@ -4702,10 +4899,10 @@
       </p:sp>
       <p:pic>
         <p:nvPicPr>
-          <p:cNvPr id="5" name="그림 4">
-            <a:extLst>
-              <a:ext uri="{FF2B5EF4-FFF2-40B4-BE49-F238E27FC236}">
-                <a16:creationId xmlns:a16="http://schemas.microsoft.com/office/drawing/2014/main" id="{AD2C6926-B205-40BA-AB63-0B2B406AA8B2}"/>
+          <p:cNvPr id="3" name="그림 2">
+            <a:extLst>
+              <a:ext uri="{FF2B5EF4-FFF2-40B4-BE49-F238E27FC236}">
+                <a16:creationId xmlns:a16="http://schemas.microsoft.com/office/drawing/2014/main" id="{937F56E7-1E45-4B76-93FE-4013A54172D1}"/>
               </a:ext>
             </a:extLst>
           </p:cNvPr>
@@ -4722,426 +4919,6 @@
         </p:blipFill>
         <p:spPr>
           <a:xfrm>
-            <a:off x="2275014" y="1812429"/>
-            <a:ext cx="7641971" cy="3233142"/>
-          </a:xfrm>
-          <a:prstGeom prst="rect">
-            <a:avLst/>
-          </a:prstGeom>
-        </p:spPr>
-      </p:pic>
-      <p:sp>
-        <p:nvSpPr>
-          <p:cNvPr id="6" name="화살표: 왼쪽 5">
-            <a:extLst>
-              <a:ext uri="{FF2B5EF4-FFF2-40B4-BE49-F238E27FC236}">
-                <a16:creationId xmlns:a16="http://schemas.microsoft.com/office/drawing/2014/main" id="{32D27459-577C-4CD0-AE12-D79ADE495D30}"/>
-              </a:ext>
-            </a:extLst>
-          </p:cNvPr>
-          <p:cNvSpPr/>
-          <p:nvPr/>
-        </p:nvSpPr>
-        <p:spPr>
-          <a:xfrm rot="19933006">
-            <a:off x="3793136" y="3373834"/>
-            <a:ext cx="2380343" cy="1008743"/>
-          </a:xfrm>
-          <a:prstGeom prst="leftArrow">
-            <a:avLst/>
-          </a:prstGeom>
-          <a:solidFill>
-            <a:srgbClr val="FF0000"/>
-          </a:solidFill>
-          <a:ln>
-            <a:noFill/>
-          </a:ln>
-        </p:spPr>
-        <p:style>
-          <a:lnRef idx="2">
-            <a:schemeClr val="accent1">
-              <a:shade val="50000"/>
-            </a:schemeClr>
-          </a:lnRef>
-          <a:fillRef idx="1">
-            <a:schemeClr val="accent1"/>
-          </a:fillRef>
-          <a:effectRef idx="0">
-            <a:schemeClr val="accent1"/>
-          </a:effectRef>
-          <a:fontRef idx="minor">
-            <a:schemeClr val="lt1"/>
-          </a:fontRef>
-        </p:style>
-        <p:txBody>
-          <a:bodyPr rtlCol="0" anchor="ctr"/>
-          <a:lstStyle/>
-          <a:p>
-            <a:pPr algn="ctr"/>
-            <a:endParaRPr lang="ko-KR" altLang="en-US" dirty="0"/>
-          </a:p>
-        </p:txBody>
-      </p:sp>
-    </p:spTree>
-    <p:extLst>
-      <p:ext uri="{BB962C8B-B14F-4D97-AF65-F5344CB8AC3E}">
-        <p14:creationId xmlns:p14="http://schemas.microsoft.com/office/powerpoint/2010/main" val="2681029250"/>
-      </p:ext>
-    </p:extLst>
-  </p:cSld>
-  <p:clrMapOvr>
-    <a:masterClrMapping/>
-  </p:clrMapOvr>
-</p:sld>
-</file>
-
-<file path=ppt/slides/slide17.xml><?xml version="1.0" encoding="utf-8"?>
-<p:sld xmlns:a="http://schemas.openxmlformats.org/drawingml/2006/main" xmlns:r="http://schemas.openxmlformats.org/officeDocument/2006/relationships" xmlns:p="http://schemas.openxmlformats.org/presentationml/2006/main">
-  <p:cSld>
-    <p:spTree>
-      <p:nvGrpSpPr>
-        <p:cNvPr id="1" name=""/>
-        <p:cNvGrpSpPr/>
-        <p:nvPr/>
-      </p:nvGrpSpPr>
-      <p:grpSpPr>
-        <a:xfrm>
-          <a:off x="0" y="0"/>
-          <a:ext cx="0" cy="0"/>
-          <a:chOff x="0" y="0"/>
-          <a:chExt cx="0" cy="0"/>
-        </a:xfrm>
-      </p:grpSpPr>
-      <p:sp>
-        <p:nvSpPr>
-          <p:cNvPr id="4" name="TextBox 3">
-            <a:extLst>
-              <a:ext uri="{FF2B5EF4-FFF2-40B4-BE49-F238E27FC236}">
-                <a16:creationId xmlns:a16="http://schemas.microsoft.com/office/drawing/2014/main" id="{BFADF8CE-1337-48D6-BD81-D19E12B2095B}"/>
-              </a:ext>
-            </a:extLst>
-          </p:cNvPr>
-          <p:cNvSpPr txBox="1"/>
-          <p:nvPr/>
-        </p:nvSpPr>
-        <p:spPr>
-          <a:xfrm>
-            <a:off x="553926" y="437882"/>
-            <a:ext cx="11468501" cy="923330"/>
-          </a:xfrm>
-          <a:prstGeom prst="rect">
-            <a:avLst/>
-          </a:prstGeom>
-          <a:noFill/>
-        </p:spPr>
-        <p:txBody>
-          <a:bodyPr wrap="square" rtlCol="0">
-            <a:spAutoFit/>
-          </a:bodyPr>
-          <a:lstStyle/>
-          <a:p>
-            <a:r>
-              <a:rPr lang="en-US" altLang="ko-KR" dirty="0"/>
-              <a:t>13. repository </a:t>
-            </a:r>
-            <a:r>
-              <a:rPr lang="ko-KR" altLang="en-US" dirty="0"/>
-              <a:t>화면에서 </a:t>
-            </a:r>
-            <a:r>
-              <a:rPr lang="en-US" altLang="ko-KR" dirty="0"/>
-              <a:t>Actions </a:t>
-            </a:r>
-            <a:r>
-              <a:rPr lang="ko-KR" altLang="en-US" dirty="0"/>
-              <a:t>탭을 클릭하면 현재 페이지가 만들어지고 있음을 확인하고 있습니다</a:t>
-            </a:r>
-            <a:r>
-              <a:rPr lang="en-US" altLang="ko-KR" dirty="0"/>
-              <a:t>.</a:t>
-            </a:r>
-          </a:p>
-          <a:p>
-            <a:r>
-              <a:rPr lang="ko-KR" altLang="en-US" dirty="0"/>
-              <a:t>앞의 노란색 동그라미가 초록색 체크로 바뀌면 다시 </a:t>
-            </a:r>
-            <a:r>
-              <a:rPr lang="en-US" altLang="ko-KR" dirty="0" err="1"/>
-              <a:t>url</a:t>
-            </a:r>
-            <a:r>
-              <a:rPr lang="ko-KR" altLang="en-US" dirty="0"/>
-              <a:t>로 들어가 수정이 제대로 반영되었는지 확인하시면 됩니다</a:t>
-            </a:r>
-            <a:r>
-              <a:rPr lang="en-US" altLang="ko-KR" dirty="0"/>
-              <a:t>.</a:t>
-            </a:r>
-            <a:endParaRPr lang="fr-FR" altLang="ko-KR" dirty="0"/>
-          </a:p>
-        </p:txBody>
-      </p:sp>
-      <p:pic>
-        <p:nvPicPr>
-          <p:cNvPr id="5" name="그림 4">
-            <a:extLst>
-              <a:ext uri="{FF2B5EF4-FFF2-40B4-BE49-F238E27FC236}">
-                <a16:creationId xmlns:a16="http://schemas.microsoft.com/office/drawing/2014/main" id="{712555F7-BD83-4EFF-AFD8-8D235D86CCCD}"/>
-              </a:ext>
-            </a:extLst>
-          </p:cNvPr>
-          <p:cNvPicPr>
-            <a:picLocks noChangeAspect="1"/>
-          </p:cNvPicPr>
-          <p:nvPr/>
-        </p:nvPicPr>
-        <p:blipFill>
-          <a:blip r:embed="rId2"/>
-          <a:stretch>
-            <a:fillRect/>
-          </a:stretch>
-        </p:blipFill>
-        <p:spPr>
-          <a:xfrm>
-            <a:off x="1434071" y="1569281"/>
-            <a:ext cx="9323858" cy="4762625"/>
-          </a:xfrm>
-          <a:prstGeom prst="rect">
-            <a:avLst/>
-          </a:prstGeom>
-        </p:spPr>
-      </p:pic>
-      <p:sp>
-        <p:nvSpPr>
-          <p:cNvPr id="6" name="화살표: 왼쪽 5">
-            <a:extLst>
-              <a:ext uri="{FF2B5EF4-FFF2-40B4-BE49-F238E27FC236}">
-                <a16:creationId xmlns:a16="http://schemas.microsoft.com/office/drawing/2014/main" id="{5387F965-0724-4066-9C84-58B7E6DE8FF8}"/>
-              </a:ext>
-            </a:extLst>
-          </p:cNvPr>
-          <p:cNvSpPr/>
-          <p:nvPr/>
-        </p:nvSpPr>
-        <p:spPr>
-          <a:xfrm rot="1240871">
-            <a:off x="3806401" y="2320200"/>
-            <a:ext cx="2380343" cy="1008743"/>
-          </a:xfrm>
-          <a:prstGeom prst="leftArrow">
-            <a:avLst/>
-          </a:prstGeom>
-          <a:solidFill>
-            <a:srgbClr val="FF0000"/>
-          </a:solidFill>
-          <a:ln>
-            <a:noFill/>
-          </a:ln>
-        </p:spPr>
-        <p:style>
-          <a:lnRef idx="2">
-            <a:schemeClr val="accent1">
-              <a:shade val="50000"/>
-            </a:schemeClr>
-          </a:lnRef>
-          <a:fillRef idx="1">
-            <a:schemeClr val="accent1"/>
-          </a:fillRef>
-          <a:effectRef idx="0">
-            <a:schemeClr val="accent1"/>
-          </a:effectRef>
-          <a:fontRef idx="minor">
-            <a:schemeClr val="lt1"/>
-          </a:fontRef>
-        </p:style>
-        <p:txBody>
-          <a:bodyPr rtlCol="0" anchor="ctr"/>
-          <a:lstStyle/>
-          <a:p>
-            <a:pPr algn="ctr"/>
-            <a:endParaRPr lang="ko-KR" altLang="en-US" dirty="0"/>
-          </a:p>
-        </p:txBody>
-      </p:sp>
-      <p:pic>
-        <p:nvPicPr>
-          <p:cNvPr id="7" name="그림 6">
-            <a:extLst>
-              <a:ext uri="{FF2B5EF4-FFF2-40B4-BE49-F238E27FC236}">
-                <a16:creationId xmlns:a16="http://schemas.microsoft.com/office/drawing/2014/main" id="{45147D80-5A20-4C23-8D53-BDDE7BCC9945}"/>
-              </a:ext>
-            </a:extLst>
-          </p:cNvPr>
-          <p:cNvPicPr>
-            <a:picLocks noChangeAspect="1"/>
-          </p:cNvPicPr>
-          <p:nvPr/>
-        </p:nvPicPr>
-        <p:blipFill>
-          <a:blip r:embed="rId3"/>
-          <a:stretch>
-            <a:fillRect/>
-          </a:stretch>
-        </p:blipFill>
-        <p:spPr>
-          <a:xfrm>
-            <a:off x="4003934" y="3075115"/>
-            <a:ext cx="7043241" cy="3782885"/>
-          </a:xfrm>
-          <a:prstGeom prst="rect">
-            <a:avLst/>
-          </a:prstGeom>
-        </p:spPr>
-      </p:pic>
-      <p:sp>
-        <p:nvSpPr>
-          <p:cNvPr id="8" name="화살표: 왼쪽 7">
-            <a:extLst>
-              <a:ext uri="{FF2B5EF4-FFF2-40B4-BE49-F238E27FC236}">
-                <a16:creationId xmlns:a16="http://schemas.microsoft.com/office/drawing/2014/main" id="{44566BC8-7F3E-4A23-B157-B1EC6DEC1A84}"/>
-              </a:ext>
-            </a:extLst>
-          </p:cNvPr>
-          <p:cNvSpPr/>
-          <p:nvPr/>
-        </p:nvSpPr>
-        <p:spPr>
-          <a:xfrm rot="1240871">
-            <a:off x="5748966" y="4784347"/>
-            <a:ext cx="2380343" cy="1008743"/>
-          </a:xfrm>
-          <a:prstGeom prst="leftArrow">
-            <a:avLst/>
-          </a:prstGeom>
-          <a:solidFill>
-            <a:srgbClr val="FF0000"/>
-          </a:solidFill>
-          <a:ln>
-            <a:noFill/>
-          </a:ln>
-        </p:spPr>
-        <p:style>
-          <a:lnRef idx="2">
-            <a:schemeClr val="accent1">
-              <a:shade val="50000"/>
-            </a:schemeClr>
-          </a:lnRef>
-          <a:fillRef idx="1">
-            <a:schemeClr val="accent1"/>
-          </a:fillRef>
-          <a:effectRef idx="0">
-            <a:schemeClr val="accent1"/>
-          </a:effectRef>
-          <a:fontRef idx="minor">
-            <a:schemeClr val="lt1"/>
-          </a:fontRef>
-        </p:style>
-        <p:txBody>
-          <a:bodyPr rtlCol="0" anchor="ctr"/>
-          <a:lstStyle/>
-          <a:p>
-            <a:pPr algn="ctr"/>
-            <a:endParaRPr lang="ko-KR" altLang="en-US" dirty="0"/>
-          </a:p>
-        </p:txBody>
-      </p:sp>
-    </p:spTree>
-    <p:extLst>
-      <p:ext uri="{BB962C8B-B14F-4D97-AF65-F5344CB8AC3E}">
-        <p14:creationId xmlns:p14="http://schemas.microsoft.com/office/powerpoint/2010/main" val="3186227767"/>
-      </p:ext>
-    </p:extLst>
-  </p:cSld>
-  <p:clrMapOvr>
-    <a:masterClrMapping/>
-  </p:clrMapOvr>
-</p:sld>
-</file>
-
-<file path=ppt/slides/slide18.xml><?xml version="1.0" encoding="utf-8"?>
-<p:sld xmlns:a="http://schemas.openxmlformats.org/drawingml/2006/main" xmlns:r="http://schemas.openxmlformats.org/officeDocument/2006/relationships" xmlns:p="http://schemas.openxmlformats.org/presentationml/2006/main">
-  <p:cSld>
-    <p:spTree>
-      <p:nvGrpSpPr>
-        <p:cNvPr id="1" name=""/>
-        <p:cNvGrpSpPr/>
-        <p:nvPr/>
-      </p:nvGrpSpPr>
-      <p:grpSpPr>
-        <a:xfrm>
-          <a:off x="0" y="0"/>
-          <a:ext cx="0" cy="0"/>
-          <a:chOff x="0" y="0"/>
-          <a:chExt cx="0" cy="0"/>
-        </a:xfrm>
-      </p:grpSpPr>
-      <p:sp>
-        <p:nvSpPr>
-          <p:cNvPr id="4" name="TextBox 3">
-            <a:extLst>
-              <a:ext uri="{FF2B5EF4-FFF2-40B4-BE49-F238E27FC236}">
-                <a16:creationId xmlns:a16="http://schemas.microsoft.com/office/drawing/2014/main" id="{BFADF8CE-1337-48D6-BD81-D19E12B2095B}"/>
-              </a:ext>
-            </a:extLst>
-          </p:cNvPr>
-          <p:cNvSpPr txBox="1"/>
-          <p:nvPr/>
-        </p:nvSpPr>
-        <p:spPr>
-          <a:xfrm>
-            <a:off x="553926" y="437882"/>
-            <a:ext cx="11468501" cy="369332"/>
-          </a:xfrm>
-          <a:prstGeom prst="rect">
-            <a:avLst/>
-          </a:prstGeom>
-          <a:noFill/>
-        </p:spPr>
-        <p:txBody>
-          <a:bodyPr wrap="square" rtlCol="0">
-            <a:spAutoFit/>
-          </a:bodyPr>
-          <a:lstStyle/>
-          <a:p>
-            <a:r>
-              <a:rPr lang="en-US" altLang="ko-KR" dirty="0"/>
-              <a:t>14. </a:t>
-            </a:r>
-            <a:r>
-              <a:rPr lang="ko-KR" altLang="en-US" dirty="0"/>
-              <a:t>바뀐 결과는 다음과 같습니다</a:t>
-            </a:r>
-            <a:r>
-              <a:rPr lang="en-US" altLang="ko-KR" dirty="0"/>
-              <a:t>.</a:t>
-            </a:r>
-            <a:endParaRPr lang="fr-FR" altLang="ko-KR" dirty="0"/>
-          </a:p>
-        </p:txBody>
-      </p:sp>
-      <p:pic>
-        <p:nvPicPr>
-          <p:cNvPr id="3" name="그림 2">
-            <a:extLst>
-              <a:ext uri="{FF2B5EF4-FFF2-40B4-BE49-F238E27FC236}">
-                <a16:creationId xmlns:a16="http://schemas.microsoft.com/office/drawing/2014/main" id="{937F56E7-1E45-4B76-93FE-4013A54172D1}"/>
-              </a:ext>
-            </a:extLst>
-          </p:cNvPr>
-          <p:cNvPicPr>
-            <a:picLocks noChangeAspect="1"/>
-          </p:cNvPicPr>
-          <p:nvPr/>
-        </p:nvPicPr>
-        <p:blipFill>
-          <a:blip r:embed="rId2"/>
-          <a:stretch>
-            <a:fillRect/>
-          </a:stretch>
-        </p:blipFill>
-        <p:spPr>
-          <a:xfrm>
             <a:off x="2752799" y="1446945"/>
             <a:ext cx="6686402" cy="5029710"/>
           </a:xfrm>
@@ -5154,117 +4931,6 @@
     <p:extLst>
       <p:ext uri="{BB962C8B-B14F-4D97-AF65-F5344CB8AC3E}">
         <p14:creationId xmlns:p14="http://schemas.microsoft.com/office/powerpoint/2010/main" val="3439807714"/>
-      </p:ext>
-    </p:extLst>
-  </p:cSld>
-  <p:clrMapOvr>
-    <a:masterClrMapping/>
-  </p:clrMapOvr>
-</p:sld>
-</file>
-
-<file path=ppt/slides/slide19.xml><?xml version="1.0" encoding="utf-8"?>
-<p:sld xmlns:a="http://schemas.openxmlformats.org/drawingml/2006/main" xmlns:r="http://schemas.openxmlformats.org/officeDocument/2006/relationships" xmlns:p="http://schemas.openxmlformats.org/presentationml/2006/main">
-  <p:cSld>
-    <p:spTree>
-      <p:nvGrpSpPr>
-        <p:cNvPr id="1" name=""/>
-        <p:cNvGrpSpPr/>
-        <p:nvPr/>
-      </p:nvGrpSpPr>
-      <p:grpSpPr>
-        <a:xfrm>
-          <a:off x="0" y="0"/>
-          <a:ext cx="0" cy="0"/>
-          <a:chOff x="0" y="0"/>
-          <a:chExt cx="0" cy="0"/>
-        </a:xfrm>
-      </p:grpSpPr>
-      <p:sp>
-        <p:nvSpPr>
-          <p:cNvPr id="2" name="제목 1">
-            <a:extLst>
-              <a:ext uri="{FF2B5EF4-FFF2-40B4-BE49-F238E27FC236}">
-                <a16:creationId xmlns:a16="http://schemas.microsoft.com/office/drawing/2014/main" id="{045BFD3F-AFC6-45E1-898F-7CCA5AE62226}"/>
-              </a:ext>
-            </a:extLst>
-          </p:cNvPr>
-          <p:cNvSpPr>
-            <a:spLocks noGrp="1"/>
-          </p:cNvSpPr>
-          <p:nvPr>
-            <p:ph type="title"/>
-          </p:nvPr>
-        </p:nvSpPr>
-        <p:spPr>
-          <a:xfrm>
-            <a:off x="838200" y="2766218"/>
-            <a:ext cx="10515600" cy="1325563"/>
-          </a:xfrm>
-        </p:spPr>
-        <p:txBody>
-          <a:bodyPr/>
-          <a:lstStyle/>
-          <a:p>
-            <a:r>
-              <a:rPr lang="en-US" altLang="ko-KR" dirty="0"/>
-              <a:t>2. local</a:t>
-            </a:r>
-            <a:r>
-              <a:rPr lang="ko-KR" altLang="en-US" dirty="0"/>
-              <a:t>에서 수정하기</a:t>
-            </a:r>
-          </a:p>
-        </p:txBody>
-      </p:sp>
-      <p:sp>
-        <p:nvSpPr>
-          <p:cNvPr id="3" name="TextBox 2">
-            <a:extLst>
-              <a:ext uri="{FF2B5EF4-FFF2-40B4-BE49-F238E27FC236}">
-                <a16:creationId xmlns:a16="http://schemas.microsoft.com/office/drawing/2014/main" id="{B8435BE5-4459-4F5A-B9D7-BA6B728FD59B}"/>
-              </a:ext>
-            </a:extLst>
-          </p:cNvPr>
-          <p:cNvSpPr txBox="1"/>
-          <p:nvPr/>
-        </p:nvSpPr>
-        <p:spPr>
-          <a:xfrm>
-            <a:off x="2260242" y="5196625"/>
-            <a:ext cx="3400290" cy="369332"/>
-          </a:xfrm>
-          <a:prstGeom prst="rect">
-            <a:avLst/>
-          </a:prstGeom>
-          <a:noFill/>
-        </p:spPr>
-        <p:txBody>
-          <a:bodyPr wrap="none" rtlCol="0">
-            <a:spAutoFit/>
-          </a:bodyPr>
-          <a:lstStyle/>
-          <a:p>
-            <a:r>
-              <a:rPr lang="ko-KR" altLang="en-US" dirty="0"/>
-              <a:t>과정이 복잡하여 </a:t>
-            </a:r>
-            <a:r>
-              <a:rPr lang="ko-KR" altLang="en-US" dirty="0" err="1"/>
-              <a:t>작성중입니다</a:t>
-            </a:r>
-            <a:r>
-              <a:rPr lang="en-US" altLang="ko-KR" dirty="0"/>
-              <a:t>.</a:t>
-            </a:r>
-            <a:endParaRPr lang="ko-KR" altLang="en-US" dirty="0"/>
-          </a:p>
-        </p:txBody>
-      </p:sp>
-    </p:spTree>
-    <p:extLst>
-      <p:ext uri="{BB962C8B-B14F-4D97-AF65-F5344CB8AC3E}">
-        <p14:creationId xmlns:p14="http://schemas.microsoft.com/office/powerpoint/2010/main" val="3569061675"/>
       </p:ext>
     </p:extLst>
   </p:cSld>
@@ -5293,10 +4959,10 @@
       </p:grpSpPr>
       <p:sp>
         <p:nvSpPr>
-          <p:cNvPr id="3" name="내용 개체 틀 2">
-            <a:extLst>
-              <a:ext uri="{FF2B5EF4-FFF2-40B4-BE49-F238E27FC236}">
-                <a16:creationId xmlns:a16="http://schemas.microsoft.com/office/drawing/2014/main" id="{0C389102-1213-49E6-9901-67908CCBDDB9}"/>
+          <p:cNvPr id="2" name="제목 1">
+            <a:extLst>
+              <a:ext uri="{FF2B5EF4-FFF2-40B4-BE49-F238E27FC236}">
+                <a16:creationId xmlns:a16="http://schemas.microsoft.com/office/drawing/2014/main" id="{045BFD3F-AFC6-45E1-898F-7CCA5AE62226}"/>
               </a:ext>
             </a:extLst>
           </p:cNvPr>
@@ -5304,319 +4970,42 @@
             <a:spLocks noGrp="1"/>
           </p:cNvSpPr>
           <p:nvPr>
-            <p:ph idx="1"/>
+            <p:ph type="title"/>
           </p:nvPr>
         </p:nvSpPr>
         <p:spPr>
           <a:xfrm>
-            <a:off x="838200" y="1378858"/>
-            <a:ext cx="10515600" cy="5552849"/>
-          </a:xfrm>
-        </p:spPr>
-        <p:txBody>
-          <a:bodyPr>
-            <a:normAutofit lnSpcReduction="10000"/>
-          </a:bodyPr>
-          <a:lstStyle/>
-          <a:p>
-            <a:pPr marL="514350" indent="-514350">
-              <a:buAutoNum type="arabicPeriod"/>
-            </a:pPr>
-            <a:r>
-              <a:rPr lang="en-US" altLang="ko-KR" b="1" dirty="0" err="1"/>
+            <a:off x="838200" y="2766218"/>
+            <a:ext cx="10515600" cy="1325563"/>
+          </a:xfrm>
+        </p:spPr>
+        <p:txBody>
+          <a:bodyPr/>
+          <a:lstStyle/>
+          <a:p>
+            <a:r>
+              <a:rPr lang="en-US" altLang="ko-KR" dirty="0"/>
+              <a:t>1. </a:t>
+            </a:r>
+            <a:r>
+              <a:rPr lang="en-US" altLang="ko-KR" dirty="0" err="1"/>
               <a:t>Github</a:t>
             </a:r>
             <a:r>
-              <a:rPr lang="en-US" altLang="ko-KR" b="1" dirty="0"/>
+              <a:rPr lang="en-US" altLang="ko-KR" dirty="0"/>
               <a:t> </a:t>
             </a:r>
             <a:r>
-              <a:rPr lang="ko-KR" altLang="en-US" b="1" dirty="0"/>
-              <a:t>웹페이지에서 바로 수정하기</a:t>
-            </a:r>
-            <a:endParaRPr lang="en-US" altLang="ko-KR" b="1" dirty="0"/>
-          </a:p>
-          <a:p>
-            <a:pPr lvl="1"/>
-            <a:r>
-              <a:rPr lang="ko-KR" altLang="en-US" dirty="0"/>
-              <a:t>프로그램의 설치가 필요 없습니다</a:t>
-            </a:r>
-            <a:r>
-              <a:rPr lang="en-US" altLang="ko-KR" dirty="0"/>
-              <a:t>.</a:t>
-            </a:r>
-          </a:p>
-          <a:p>
-            <a:pPr lvl="1"/>
-            <a:r>
-              <a:rPr lang="ko-KR" altLang="en-US" dirty="0"/>
-              <a:t>간단합니다</a:t>
-            </a:r>
-            <a:r>
-              <a:rPr lang="en-US" altLang="ko-KR" dirty="0"/>
-              <a:t>.</a:t>
-            </a:r>
-          </a:p>
-          <a:p>
-            <a:pPr lvl="1"/>
-            <a:r>
-              <a:rPr lang="ko-KR" altLang="en-US" dirty="0"/>
-              <a:t>버전 관리가 힘듭니다</a:t>
-            </a:r>
-            <a:r>
-              <a:rPr lang="en-US" altLang="ko-KR" dirty="0"/>
-              <a:t>. </a:t>
-            </a:r>
-            <a:r>
-              <a:rPr lang="ko-KR" altLang="en-US" dirty="0"/>
-              <a:t>페이지에 문제가 생겼을 경우 되돌리는 것이 힘들 수 있습니다</a:t>
-            </a:r>
-            <a:r>
-              <a:rPr lang="en-US" altLang="ko-KR" dirty="0"/>
-              <a:t>.</a:t>
-            </a:r>
-          </a:p>
-          <a:p>
-            <a:pPr lvl="1"/>
-            <a:r>
-              <a:rPr lang="ko-KR" altLang="en-US" dirty="0"/>
-              <a:t>간단한 내용을 추가하는 것이라면 문제가 없을 것으로 예상합니다</a:t>
-            </a:r>
-            <a:r>
-              <a:rPr lang="en-US" altLang="ko-KR" dirty="0"/>
-              <a:t>.</a:t>
-            </a:r>
-          </a:p>
-          <a:p>
-            <a:pPr marL="514350" indent="-514350">
-              <a:buAutoNum type="arabicPeriod"/>
-            </a:pPr>
-            <a:endParaRPr lang="en-US" altLang="ko-KR" dirty="0"/>
-          </a:p>
-          <a:p>
-            <a:pPr marL="514350" indent="-514350">
-              <a:buAutoNum type="arabicPeriod"/>
-            </a:pPr>
-            <a:r>
-              <a:rPr lang="en-US" altLang="ko-KR" b="1" dirty="0"/>
-              <a:t>local</a:t>
-            </a:r>
-            <a:r>
-              <a:rPr lang="ko-KR" altLang="en-US" b="1" dirty="0"/>
-              <a:t>에서 수정하기</a:t>
-            </a:r>
-            <a:endParaRPr lang="en-US" altLang="ko-KR" b="1" dirty="0"/>
-          </a:p>
-          <a:p>
-            <a:pPr lvl="1"/>
-            <a:r>
-              <a:rPr lang="en-US" altLang="ko-KR" dirty="0"/>
-              <a:t>Git</a:t>
-            </a:r>
-            <a:r>
-              <a:rPr lang="ko-KR" altLang="en-US" dirty="0"/>
-              <a:t>의 설치가 필요합니다</a:t>
-            </a:r>
-            <a:r>
-              <a:rPr lang="en-US" altLang="ko-KR" dirty="0"/>
-              <a:t>.</a:t>
-            </a:r>
-          </a:p>
-          <a:p>
-            <a:pPr lvl="1"/>
-            <a:r>
-              <a:rPr lang="en-US" altLang="ko-KR" dirty="0" err="1"/>
-              <a:t>Vscode</a:t>
-            </a:r>
-            <a:r>
-              <a:rPr lang="ko-KR" altLang="en-US" dirty="0"/>
-              <a:t>의 설치가 필요합니다</a:t>
-            </a:r>
-            <a:r>
-              <a:rPr lang="en-US" altLang="ko-KR" dirty="0"/>
-              <a:t>. (</a:t>
-            </a:r>
-            <a:r>
-              <a:rPr lang="ko-KR" altLang="en-US" dirty="0"/>
-              <a:t>메모장도 가능합니다</a:t>
-            </a:r>
-            <a:r>
-              <a:rPr lang="en-US" altLang="ko-KR" dirty="0"/>
-              <a:t>.)</a:t>
-            </a:r>
-          </a:p>
-          <a:p>
-            <a:pPr lvl="1"/>
-            <a:r>
-              <a:rPr lang="en-US" altLang="ko-KR" dirty="0"/>
-              <a:t>Jekyll</a:t>
-            </a:r>
-            <a:r>
-              <a:rPr lang="ko-KR" altLang="en-US" dirty="0"/>
-              <a:t>의 설치가 필요합니다</a:t>
-            </a:r>
-            <a:r>
-              <a:rPr lang="en-US" altLang="ko-KR" dirty="0"/>
-              <a:t>. </a:t>
-            </a:r>
-            <a:r>
-              <a:rPr lang="ko-KR" altLang="en-US" dirty="0"/>
-              <a:t>이는 홈페이지를 수정하고 미리보기 </a:t>
-            </a:r>
-            <a:r>
-              <a:rPr lang="ko-KR" altLang="en-US" dirty="0" err="1"/>
-              <a:t>위함입니다</a:t>
-            </a:r>
-            <a:r>
-              <a:rPr lang="en-US" altLang="ko-KR" dirty="0"/>
-              <a:t>.  </a:t>
-            </a:r>
-            <a:r>
-              <a:rPr lang="ko-KR" altLang="en-US" dirty="0"/>
-              <a:t>홈페이지에 파일과 정보가 </a:t>
-            </a:r>
-            <a:r>
-              <a:rPr lang="ko-KR" altLang="en-US" dirty="0" err="1"/>
-              <a:t>많다보니</a:t>
-            </a:r>
-            <a:r>
-              <a:rPr lang="ko-KR" altLang="en-US" dirty="0"/>
-              <a:t> 수정해서 올렸을 때 수정된 실제 페이지를 보기까지 시간이 오래 걸릴 수 있어 미리보기를 추천합니다</a:t>
-            </a:r>
-            <a:r>
-              <a:rPr lang="en-US" altLang="ko-KR" dirty="0"/>
-              <a:t>. </a:t>
-            </a:r>
-            <a:r>
-              <a:rPr lang="ko-KR" altLang="en-US" dirty="0"/>
-              <a:t>한 번 수정하면 </a:t>
-            </a:r>
-            <a:r>
-              <a:rPr lang="en-US" altLang="ko-KR" dirty="0"/>
-              <a:t>15</a:t>
-            </a:r>
-            <a:r>
-              <a:rPr lang="ko-KR" altLang="en-US" dirty="0"/>
-              <a:t>분 이상 걸릴 수 있습니다</a:t>
-            </a:r>
-            <a:r>
-              <a:rPr lang="en-US" altLang="ko-KR" dirty="0"/>
-              <a:t>.</a:t>
-            </a:r>
-          </a:p>
-          <a:p>
-            <a:pPr lvl="1"/>
-            <a:endParaRPr lang="ko-KR" altLang="en-US" dirty="0"/>
-          </a:p>
-        </p:txBody>
-      </p:sp>
-      <p:sp>
-        <p:nvSpPr>
-          <p:cNvPr id="4" name="TextBox 3">
-            <a:extLst>
-              <a:ext uri="{FF2B5EF4-FFF2-40B4-BE49-F238E27FC236}">
-                <a16:creationId xmlns:a16="http://schemas.microsoft.com/office/drawing/2014/main" id="{11277F7B-9451-495D-83CA-8214783393CB}"/>
-              </a:ext>
-            </a:extLst>
-          </p:cNvPr>
-          <p:cNvSpPr txBox="1"/>
-          <p:nvPr/>
-        </p:nvSpPr>
-        <p:spPr>
-          <a:xfrm>
-            <a:off x="838200" y="377371"/>
-            <a:ext cx="8983550" cy="646331"/>
-          </a:xfrm>
-          <a:prstGeom prst="rect">
-            <a:avLst/>
-          </a:prstGeom>
-          <a:noFill/>
-        </p:spPr>
-        <p:txBody>
-          <a:bodyPr wrap="none" rtlCol="0">
-            <a:spAutoFit/>
-          </a:bodyPr>
-          <a:lstStyle/>
-          <a:p>
-            <a:r>
-              <a:rPr lang="en-US" altLang="ko-KR" dirty="0"/>
-              <a:t>1</a:t>
-            </a:r>
-            <a:r>
-              <a:rPr lang="ko-KR" altLang="en-US" dirty="0"/>
-              <a:t>번과 </a:t>
-            </a:r>
-            <a:r>
-              <a:rPr lang="en-US" altLang="ko-KR" dirty="0"/>
-              <a:t>2</a:t>
-            </a:r>
-            <a:r>
-              <a:rPr lang="ko-KR" altLang="en-US" dirty="0"/>
-              <a:t>번 중 하나를 선택해서 수정하시면 됩니다</a:t>
-            </a:r>
-            <a:r>
-              <a:rPr lang="en-US" altLang="ko-KR" dirty="0"/>
-              <a:t>. </a:t>
-            </a:r>
-          </a:p>
-          <a:p>
-            <a:r>
-              <a:rPr lang="ko-KR" altLang="en-US" dirty="0"/>
-              <a:t>작은 수정</a:t>
-            </a:r>
-            <a:r>
-              <a:rPr lang="en-US" altLang="ko-KR" dirty="0"/>
-              <a:t>(</a:t>
-            </a:r>
-            <a:r>
-              <a:rPr lang="ko-KR" altLang="en-US" dirty="0"/>
-              <a:t>논문 추가 등</a:t>
-            </a:r>
-            <a:r>
-              <a:rPr lang="en-US" altLang="ko-KR" dirty="0"/>
-              <a:t>)</a:t>
-            </a:r>
-            <a:r>
-              <a:rPr lang="ko-KR" altLang="en-US" dirty="0"/>
-              <a:t>은 </a:t>
-            </a:r>
-            <a:r>
-              <a:rPr lang="en-US" altLang="ko-KR" dirty="0"/>
-              <a:t>1</a:t>
-            </a:r>
-            <a:r>
-              <a:rPr lang="ko-KR" altLang="en-US" dirty="0"/>
-              <a:t>번으로도 가능합니다</a:t>
-            </a:r>
-            <a:r>
-              <a:rPr lang="en-US" altLang="ko-KR" dirty="0"/>
-              <a:t>.</a:t>
-            </a:r>
-            <a:r>
-              <a:rPr lang="ko-KR" altLang="en-US" dirty="0"/>
-              <a:t> 전체적인 수정은 </a:t>
-            </a:r>
-            <a:r>
-              <a:rPr lang="en-US" altLang="ko-KR" dirty="0"/>
-              <a:t>2</a:t>
-            </a:r>
-            <a:r>
-              <a:rPr lang="ko-KR" altLang="en-US" dirty="0"/>
-              <a:t>번을 추천합니다</a:t>
-            </a:r>
-            <a:r>
-              <a:rPr lang="en-US" altLang="ko-KR" dirty="0"/>
-              <a:t>.</a:t>
-            </a:r>
-            <a:endParaRPr lang="ko-KR" altLang="en-US" dirty="0"/>
+              <a:rPr lang="ko-KR" altLang="en-US" dirty="0"/>
+              <a:t>홈페이지에서 바로 수정하기</a:t>
+            </a:r>
           </a:p>
         </p:txBody>
       </p:sp>
     </p:spTree>
     <p:extLst>
       <p:ext uri="{BB962C8B-B14F-4D97-AF65-F5344CB8AC3E}">
-        <p14:creationId xmlns:p14="http://schemas.microsoft.com/office/powerpoint/2010/main" val="118492237"/>
+        <p14:creationId xmlns:p14="http://schemas.microsoft.com/office/powerpoint/2010/main" val="1932573977"/>
       </p:ext>
     </p:extLst>
   </p:cSld>
@@ -5643,30 +5032,61 @@
           <a:chExt cx="0" cy="0"/>
         </a:xfrm>
       </p:grpSpPr>
-      <p:sp>
-        <p:nvSpPr>
-          <p:cNvPr id="2" name="제목 1">
-            <a:extLst>
-              <a:ext uri="{FF2B5EF4-FFF2-40B4-BE49-F238E27FC236}">
-                <a16:creationId xmlns:a16="http://schemas.microsoft.com/office/drawing/2014/main" id="{045BFD3F-AFC6-45E1-898F-7CCA5AE62226}"/>
-              </a:ext>
-            </a:extLst>
-          </p:cNvPr>
-          <p:cNvSpPr>
-            <a:spLocks noGrp="1"/>
-          </p:cNvSpPr>
-          <p:nvPr>
-            <p:ph type="title"/>
-          </p:nvPr>
-        </p:nvSpPr>
+      <p:pic>
+        <p:nvPicPr>
+          <p:cNvPr id="3" name="그림 2">
+            <a:extLst>
+              <a:ext uri="{FF2B5EF4-FFF2-40B4-BE49-F238E27FC236}">
+                <a16:creationId xmlns:a16="http://schemas.microsoft.com/office/drawing/2014/main" id="{DA3A31EA-9987-4138-94AE-FC283A02B43D}"/>
+              </a:ext>
+            </a:extLst>
+          </p:cNvPr>
+          <p:cNvPicPr>
+            <a:picLocks noChangeAspect="1"/>
+          </p:cNvPicPr>
+          <p:nvPr/>
+        </p:nvPicPr>
+        <p:blipFill rotWithShape="1">
+          <a:blip r:embed="rId2"/>
+          <a:srcRect t="10343"/>
+          <a:stretch/>
+        </p:blipFill>
         <p:spPr>
           <a:xfrm>
-            <a:off x="838200" y="2766218"/>
-            <a:ext cx="10515600" cy="1325563"/>
-          </a:xfrm>
-        </p:spPr>
-        <p:txBody>
-          <a:bodyPr/>
+            <a:off x="1656360" y="1738647"/>
+            <a:ext cx="8879280" cy="4681471"/>
+          </a:xfrm>
+          <a:prstGeom prst="rect">
+            <a:avLst/>
+          </a:prstGeom>
+        </p:spPr>
+      </p:pic>
+      <p:sp>
+        <p:nvSpPr>
+          <p:cNvPr id="4" name="TextBox 3">
+            <a:extLst>
+              <a:ext uri="{FF2B5EF4-FFF2-40B4-BE49-F238E27FC236}">
+                <a16:creationId xmlns:a16="http://schemas.microsoft.com/office/drawing/2014/main" id="{65B3B6AF-4FCE-4BFF-9507-B181F4AF30B1}"/>
+              </a:ext>
+            </a:extLst>
+          </p:cNvPr>
+          <p:cNvSpPr txBox="1"/>
+          <p:nvPr/>
+        </p:nvSpPr>
+        <p:spPr>
+          <a:xfrm>
+            <a:off x="553927" y="437882"/>
+            <a:ext cx="2895344" cy="369332"/>
+          </a:xfrm>
+          <a:prstGeom prst="rect">
+            <a:avLst/>
+          </a:prstGeom>
+          <a:noFill/>
+        </p:spPr>
+        <p:txBody>
+          <a:bodyPr wrap="none" rtlCol="0">
+            <a:spAutoFit/>
+          </a:bodyPr>
           <a:lstStyle/>
           <a:p>
             <a:r>
@@ -5678,20 +5098,21 @@
               <a:t>Github</a:t>
             </a:r>
             <a:r>
-              <a:rPr lang="en-US" altLang="ko-KR" dirty="0"/>
-              <a:t> </a:t>
-            </a:r>
-            <a:r>
-              <a:rPr lang="ko-KR" altLang="en-US" dirty="0"/>
-              <a:t>홈페이지에서 바로 수정하기</a:t>
-            </a:r>
+              <a:rPr lang="ko-KR" altLang="en-US" dirty="0"/>
+              <a:t>에 로그인합니다</a:t>
+            </a:r>
+            <a:r>
+              <a:rPr lang="en-US" altLang="ko-KR" dirty="0"/>
+              <a:t>.</a:t>
+            </a:r>
+            <a:endParaRPr lang="ko-KR" altLang="en-US" dirty="0"/>
           </a:p>
         </p:txBody>
       </p:sp>
     </p:spTree>
     <p:extLst>
       <p:ext uri="{BB962C8B-B14F-4D97-AF65-F5344CB8AC3E}">
-        <p14:creationId xmlns:p14="http://schemas.microsoft.com/office/powerpoint/2010/main" val="1932573977"/>
+        <p14:creationId xmlns:p14="http://schemas.microsoft.com/office/powerpoint/2010/main" val="288093836"/>
       </p:ext>
     </p:extLst>
   </p:cSld>
@@ -5720,10 +5141,10 @@
       </p:grpSpPr>
       <p:pic>
         <p:nvPicPr>
-          <p:cNvPr id="3" name="그림 2">
-            <a:extLst>
-              <a:ext uri="{FF2B5EF4-FFF2-40B4-BE49-F238E27FC236}">
-                <a16:creationId xmlns:a16="http://schemas.microsoft.com/office/drawing/2014/main" id="{DA3A31EA-9987-4138-94AE-FC283A02B43D}"/>
+          <p:cNvPr id="6" name="그림 5">
+            <a:extLst>
+              <a:ext uri="{FF2B5EF4-FFF2-40B4-BE49-F238E27FC236}">
+                <a16:creationId xmlns:a16="http://schemas.microsoft.com/office/drawing/2014/main" id="{21BDC964-3CF6-453A-8424-DFA6125B3141}"/>
               </a:ext>
             </a:extLst>
           </p:cNvPr>
@@ -5732,15 +5153,16 @@
           </p:cNvPicPr>
           <p:nvPr/>
         </p:nvPicPr>
-        <p:blipFill rotWithShape="1">
+        <p:blipFill>
           <a:blip r:embed="rId2"/>
-          <a:srcRect t="10343"/>
-          <a:stretch/>
+          <a:stretch>
+            <a:fillRect/>
+          </a:stretch>
         </p:blipFill>
         <p:spPr>
           <a:xfrm>
-            <a:off x="1656360" y="1738647"/>
-            <a:ext cx="8879280" cy="4681471"/>
+            <a:off x="1341540" y="1718663"/>
+            <a:ext cx="9508920" cy="4664651"/>
           </a:xfrm>
           <a:prstGeom prst="rect">
             <a:avLst/>
@@ -5749,10 +5171,10 @@
       </p:pic>
       <p:sp>
         <p:nvSpPr>
-          <p:cNvPr id="4" name="TextBox 3">
-            <a:extLst>
-              <a:ext uri="{FF2B5EF4-FFF2-40B4-BE49-F238E27FC236}">
-                <a16:creationId xmlns:a16="http://schemas.microsoft.com/office/drawing/2014/main" id="{65B3B6AF-4FCE-4BFF-9507-B181F4AF30B1}"/>
+          <p:cNvPr id="7" name="TextBox 6">
+            <a:extLst>
+              <a:ext uri="{FF2B5EF4-FFF2-40B4-BE49-F238E27FC236}">
+                <a16:creationId xmlns:a16="http://schemas.microsoft.com/office/drawing/2014/main" id="{DFDB81DD-E2B6-45A1-A26B-B41D737B7C73}"/>
               </a:ext>
             </a:extLst>
           </p:cNvPr>
@@ -5762,7 +5184,7 @@
         <p:spPr>
           <a:xfrm>
             <a:off x="553927" y="437882"/>
-            <a:ext cx="2895344" cy="369332"/>
+            <a:ext cx="7110280" cy="369332"/>
           </a:xfrm>
           <a:prstGeom prst="rect">
             <a:avLst/>
@@ -5777,28 +5199,51 @@
           <a:p>
             <a:r>
               <a:rPr lang="en-US" altLang="ko-KR" dirty="0"/>
-              <a:t>1. </a:t>
-            </a:r>
-            <a:r>
-              <a:rPr lang="en-US" altLang="ko-KR" dirty="0" err="1"/>
-              <a:t>Github</a:t>
-            </a:r>
-            <a:r>
-              <a:rPr lang="ko-KR" altLang="en-US" dirty="0"/>
-              <a:t>에 로그인합니다</a:t>
-            </a:r>
-            <a:r>
-              <a:rPr lang="en-US" altLang="ko-KR" dirty="0"/>
-              <a:t>.</a:t>
-            </a:r>
-            <a:endParaRPr lang="ko-KR" altLang="en-US" dirty="0"/>
+              <a:t>2. Big</a:t>
+            </a:r>
+            <a:r>
+              <a:rPr lang="ko-KR" altLang="en-US" dirty="0"/>
+              <a:t> </a:t>
+            </a:r>
+            <a:r>
+              <a:rPr lang="en-US" altLang="ko-KR" dirty="0"/>
+              <a:t>Data</a:t>
+            </a:r>
+            <a:r>
+              <a:rPr lang="ko-KR" altLang="en-US" dirty="0"/>
+              <a:t> </a:t>
+            </a:r>
+            <a:r>
+              <a:rPr lang="en-US" altLang="ko-KR" dirty="0"/>
+              <a:t>Analytics</a:t>
+            </a:r>
+            <a:r>
+              <a:rPr lang="ko-KR" altLang="en-US" dirty="0"/>
+              <a:t> </a:t>
+            </a:r>
+            <a:r>
+              <a:rPr lang="en-US" altLang="ko-KR" dirty="0"/>
+              <a:t>Lab</a:t>
+            </a:r>
+            <a:r>
+              <a:rPr lang="ko-KR" altLang="en-US" dirty="0"/>
+              <a:t>이라는 </a:t>
+            </a:r>
+            <a:r>
+              <a:rPr lang="en-US" altLang="ko-KR" dirty="0"/>
+              <a:t>organization </a:t>
+            </a:r>
+            <a:r>
+              <a:rPr lang="ko-KR" altLang="en-US" dirty="0"/>
+              <a:t>페이지로 들어갑니다</a:t>
+            </a:r>
           </a:p>
         </p:txBody>
       </p:sp>
     </p:spTree>
     <p:extLst>
       <p:ext uri="{BB962C8B-B14F-4D97-AF65-F5344CB8AC3E}">
-        <p14:creationId xmlns:p14="http://schemas.microsoft.com/office/powerpoint/2010/main" val="288093836"/>
+        <p14:creationId xmlns:p14="http://schemas.microsoft.com/office/powerpoint/2010/main" val="3662220227"/>
       </p:ext>
     </p:extLst>
   </p:cSld>
@@ -5827,10 +5272,10 @@
       </p:grpSpPr>
       <p:pic>
         <p:nvPicPr>
-          <p:cNvPr id="6" name="그림 5">
-            <a:extLst>
-              <a:ext uri="{FF2B5EF4-FFF2-40B4-BE49-F238E27FC236}">
-                <a16:creationId xmlns:a16="http://schemas.microsoft.com/office/drawing/2014/main" id="{21BDC964-3CF6-453A-8424-DFA6125B3141}"/>
+          <p:cNvPr id="3" name="그림 2">
+            <a:extLst>
+              <a:ext uri="{FF2B5EF4-FFF2-40B4-BE49-F238E27FC236}">
+                <a16:creationId xmlns:a16="http://schemas.microsoft.com/office/drawing/2014/main" id="{0B61DADA-5E8D-49D1-B23B-C013200FB275}"/>
               </a:ext>
             </a:extLst>
           </p:cNvPr>
@@ -5847,8 +5292,8 @@
         </p:blipFill>
         <p:spPr>
           <a:xfrm>
-            <a:off x="1341540" y="1718663"/>
-            <a:ext cx="9508920" cy="4664651"/>
+            <a:off x="1434071" y="1569281"/>
+            <a:ext cx="9323858" cy="4762625"/>
           </a:xfrm>
           <a:prstGeom prst="rect">
             <a:avLst/>
@@ -5860,7 +5305,7 @@
           <p:cNvPr id="7" name="TextBox 6">
             <a:extLst>
               <a:ext uri="{FF2B5EF4-FFF2-40B4-BE49-F238E27FC236}">
-                <a16:creationId xmlns:a16="http://schemas.microsoft.com/office/drawing/2014/main" id="{DFDB81DD-E2B6-45A1-A26B-B41D737B7C73}"/>
+                <a16:creationId xmlns:a16="http://schemas.microsoft.com/office/drawing/2014/main" id="{C5B4024A-90C7-42C0-B55F-F4F02F567690}"/>
               </a:ext>
             </a:extLst>
           </p:cNvPr>
@@ -5870,7 +5315,7 @@
         <p:spPr>
           <a:xfrm>
             <a:off x="553927" y="437882"/>
-            <a:ext cx="7110280" cy="369332"/>
+            <a:ext cx="6861943" cy="369332"/>
           </a:xfrm>
           <a:prstGeom prst="rect">
             <a:avLst/>
@@ -5885,51 +5330,32 @@
           <a:p>
             <a:r>
               <a:rPr lang="en-US" altLang="ko-KR" dirty="0"/>
-              <a:t>2. Big</a:t>
-            </a:r>
-            <a:r>
-              <a:rPr lang="ko-KR" altLang="en-US" dirty="0"/>
-              <a:t> </a:t>
-            </a:r>
-            <a:r>
-              <a:rPr lang="en-US" altLang="ko-KR" dirty="0"/>
-              <a:t>Data</a:t>
-            </a:r>
-            <a:r>
-              <a:rPr lang="ko-KR" altLang="en-US" dirty="0"/>
-              <a:t> </a:t>
-            </a:r>
-            <a:r>
-              <a:rPr lang="en-US" altLang="ko-KR" dirty="0"/>
-              <a:t>Analytics</a:t>
-            </a:r>
-            <a:r>
-              <a:rPr lang="ko-KR" altLang="en-US" dirty="0"/>
-              <a:t> </a:t>
-            </a:r>
-            <a:r>
-              <a:rPr lang="en-US" altLang="ko-KR" dirty="0"/>
-              <a:t>Lab</a:t>
-            </a:r>
-            <a:r>
-              <a:rPr lang="ko-KR" altLang="en-US" dirty="0"/>
-              <a:t>이라는 </a:t>
-            </a:r>
-            <a:r>
-              <a:rPr lang="en-US" altLang="ko-KR" dirty="0"/>
-              <a:t>organization </a:t>
-            </a:r>
-            <a:r>
-              <a:rPr lang="ko-KR" altLang="en-US" dirty="0"/>
-              <a:t>페이지로 들어갑니다</a:t>
-            </a:r>
+              <a:t>3. SNU-BDA-Lab.github.io </a:t>
+            </a:r>
+            <a:r>
+              <a:rPr lang="ko-KR" altLang="en-US" dirty="0"/>
+              <a:t>라는 이름의 </a:t>
+            </a:r>
+            <a:r>
+              <a:rPr lang="en-US" altLang="ko-KR" dirty="0"/>
+              <a:t>repository</a:t>
+            </a:r>
+            <a:r>
+              <a:rPr lang="ko-KR" altLang="en-US" dirty="0"/>
+              <a:t>로 들어갑니다</a:t>
+            </a:r>
+            <a:r>
+              <a:rPr lang="en-US" altLang="ko-KR" dirty="0"/>
+              <a:t>.</a:t>
+            </a:r>
+            <a:endParaRPr lang="ko-KR" altLang="en-US" dirty="0"/>
           </a:p>
         </p:txBody>
       </p:sp>
     </p:spTree>
     <p:extLst>
       <p:ext uri="{BB962C8B-B14F-4D97-AF65-F5344CB8AC3E}">
-        <p14:creationId xmlns:p14="http://schemas.microsoft.com/office/powerpoint/2010/main" val="3662220227"/>
+        <p14:creationId xmlns:p14="http://schemas.microsoft.com/office/powerpoint/2010/main" val="4065431926"/>
       </p:ext>
     </p:extLst>
   </p:cSld>
@@ -5956,12 +5382,171 @@
           <a:chExt cx="0" cy="0"/>
         </a:xfrm>
       </p:grpSpPr>
+      <p:sp>
+        <p:nvSpPr>
+          <p:cNvPr id="4" name="TextBox 3">
+            <a:extLst>
+              <a:ext uri="{FF2B5EF4-FFF2-40B4-BE49-F238E27FC236}">
+                <a16:creationId xmlns:a16="http://schemas.microsoft.com/office/drawing/2014/main" id="{BFADF8CE-1337-48D6-BD81-D19E12B2095B}"/>
+              </a:ext>
+            </a:extLst>
+          </p:cNvPr>
+          <p:cNvSpPr txBox="1"/>
+          <p:nvPr/>
+        </p:nvSpPr>
+        <p:spPr>
+          <a:xfrm>
+            <a:off x="553926" y="437882"/>
+            <a:ext cx="11390423" cy="923330"/>
+          </a:xfrm>
+          <a:prstGeom prst="rect">
+            <a:avLst/>
+          </a:prstGeom>
+          <a:noFill/>
+        </p:spPr>
+        <p:txBody>
+          <a:bodyPr wrap="square" rtlCol="0">
+            <a:spAutoFit/>
+          </a:bodyPr>
+          <a:lstStyle/>
+          <a:p>
+            <a:r>
+              <a:rPr lang="en-US" altLang="ko-KR" dirty="0"/>
+              <a:t>4. </a:t>
+            </a:r>
+            <a:r>
+              <a:rPr lang="ko-KR" altLang="en-US" dirty="0"/>
+              <a:t>수정하고자 하는 페이지를 </a:t>
+            </a:r>
+            <a:r>
+              <a:rPr lang="en-US" altLang="ko-KR" dirty="0"/>
+              <a:t>repository</a:t>
+            </a:r>
+            <a:r>
+              <a:rPr lang="ko-KR" altLang="en-US" dirty="0"/>
+              <a:t>에서 찾습니다</a:t>
+            </a:r>
+            <a:r>
+              <a:rPr lang="en-US" altLang="ko-KR" dirty="0"/>
+              <a:t>. html</a:t>
+            </a:r>
+            <a:r>
+              <a:rPr lang="ko-KR" altLang="en-US" dirty="0"/>
+              <a:t> 파일을 찾으시면 됩니다</a:t>
+            </a:r>
+            <a:r>
+              <a:rPr lang="en-US" altLang="ko-KR" dirty="0"/>
+              <a:t>. </a:t>
+            </a:r>
+            <a:r>
+              <a:rPr lang="ko-KR" altLang="en-US" dirty="0"/>
+              <a:t>페이지의 주소를 확인하시면 </a:t>
+            </a:r>
+            <a:r>
+              <a:rPr lang="en-US" altLang="ko-KR" dirty="0"/>
+              <a:t>repository</a:t>
+            </a:r>
+            <a:r>
+              <a:rPr lang="ko-KR" altLang="en-US" dirty="0"/>
+              <a:t> 내에서 어디에 저장되어 있는지 더 편하게 찾으실 수 있습니다</a:t>
+            </a:r>
+            <a:r>
+              <a:rPr lang="en-US" altLang="ko-KR" dirty="0"/>
+              <a:t>.</a:t>
+            </a:r>
+          </a:p>
+          <a:p>
+            <a:r>
+              <a:rPr lang="en-US" altLang="ko-KR" dirty="0"/>
+              <a:t>Publications</a:t>
+            </a:r>
+            <a:r>
+              <a:rPr lang="ko-KR" altLang="en-US" dirty="0"/>
+              <a:t>은</a:t>
+            </a:r>
+            <a:r>
+              <a:rPr lang="en-US" altLang="ko-KR" dirty="0"/>
+              <a:t> members &gt; </a:t>
+            </a:r>
+            <a:r>
+              <a:rPr lang="fr-FR" altLang="ko-KR" b="0" i="0" u="sng" dirty="0">
+                <a:solidFill>
+                  <a:schemeClr val="accent1"/>
+                </a:solidFill>
+                <a:effectLst/>
+                <a:latin typeface="-apple-system"/>
+                <a:hlinkClick r:id="rId2" tooltip="hyoung-joo_kim_publication.html">
+                  <a:extLst>
+                    <a:ext uri="{A12FA001-AC4F-418D-AE19-62706E023703}">
+                      <ahyp:hlinkClr xmlns:ahyp="http://schemas.microsoft.com/office/drawing/2018/hyperlinkcolor" val="tx"/>
+                    </a:ext>
+                  </a:extLst>
+                </a:hlinkClick>
+              </a:rPr>
+              <a:t>hyoung-joo_kim_publication.html</a:t>
+            </a:r>
+            <a:r>
+              <a:rPr lang="ko-KR" altLang="en-US" dirty="0">
+                <a:latin typeface="-apple-system"/>
+              </a:rPr>
+              <a:t> 에 하나</a:t>
+            </a:r>
+            <a:r>
+              <a:rPr lang="en-US" altLang="ko-KR" dirty="0">
+                <a:latin typeface="-apple-system"/>
+              </a:rPr>
+              <a:t>, publication</a:t>
+            </a:r>
+            <a:r>
+              <a:rPr lang="ko-KR" altLang="en-US" dirty="0">
+                <a:latin typeface="-apple-system"/>
+              </a:rPr>
+              <a:t> </a:t>
+            </a:r>
+            <a:r>
+              <a:rPr lang="en-US" altLang="ko-KR" dirty="0">
+                <a:latin typeface="-apple-system"/>
+              </a:rPr>
+              <a:t>&gt;</a:t>
+            </a:r>
+            <a:r>
+              <a:rPr lang="ko-KR" altLang="en-US" dirty="0">
+                <a:latin typeface="-apple-system"/>
+              </a:rPr>
+              <a:t> </a:t>
+            </a:r>
+            <a:r>
+              <a:rPr lang="fr-FR" altLang="ko-KR" b="0" i="0" u="none" strike="noStrike" dirty="0">
+                <a:effectLst/>
+                <a:latin typeface="-apple-system"/>
+                <a:hlinkClick r:id="rId3" tooltip="index.html"/>
+              </a:rPr>
+              <a:t>index.html</a:t>
+            </a:r>
+            <a:r>
+              <a:rPr lang="ko-KR" altLang="en-US" b="0" i="0" u="none" strike="noStrike" dirty="0">
+                <a:effectLst/>
+                <a:latin typeface="-apple-system"/>
+              </a:rPr>
+              <a:t> 에 하나가 있습니다</a:t>
+            </a:r>
+            <a:r>
+              <a:rPr lang="en-US" altLang="ko-KR" b="0" i="0" u="none" strike="noStrike" dirty="0">
+                <a:effectLst/>
+                <a:latin typeface="-apple-system"/>
+              </a:rPr>
+              <a:t>.</a:t>
+            </a:r>
+            <a:endParaRPr lang="ko-KR" altLang="en-US" dirty="0"/>
+          </a:p>
+        </p:txBody>
+      </p:sp>
       <p:pic>
         <p:nvPicPr>
-          <p:cNvPr id="3" name="그림 2">
-            <a:extLst>
-              <a:ext uri="{FF2B5EF4-FFF2-40B4-BE49-F238E27FC236}">
-                <a16:creationId xmlns:a16="http://schemas.microsoft.com/office/drawing/2014/main" id="{0B61DADA-5E8D-49D1-B23B-C013200FB275}"/>
+          <p:cNvPr id="6" name="그림 5">
+            <a:extLst>
+              <a:ext uri="{FF2B5EF4-FFF2-40B4-BE49-F238E27FC236}">
+                <a16:creationId xmlns:a16="http://schemas.microsoft.com/office/drawing/2014/main" id="{8819BB91-0D68-46AD-AFDE-F98CA627E935}"/>
               </a:ext>
             </a:extLst>
           </p:cNvPr>
@@ -5971,77 +5556,25 @@
           <p:nvPr/>
         </p:nvPicPr>
         <p:blipFill>
-          <a:blip r:embed="rId2"/>
+          <a:blip r:embed="rId4"/>
           <a:stretch>
             <a:fillRect/>
           </a:stretch>
         </p:blipFill>
         <p:spPr>
           <a:xfrm>
-            <a:off x="1434071" y="1569281"/>
-            <a:ext cx="9323858" cy="4762625"/>
+            <a:off x="1639142" y="1828800"/>
+            <a:ext cx="8913716" cy="4475408"/>
           </a:xfrm>
           <a:prstGeom prst="rect">
             <a:avLst/>
           </a:prstGeom>
         </p:spPr>
       </p:pic>
-      <p:sp>
-        <p:nvSpPr>
-          <p:cNvPr id="7" name="TextBox 6">
-            <a:extLst>
-              <a:ext uri="{FF2B5EF4-FFF2-40B4-BE49-F238E27FC236}">
-                <a16:creationId xmlns:a16="http://schemas.microsoft.com/office/drawing/2014/main" id="{C5B4024A-90C7-42C0-B55F-F4F02F567690}"/>
-              </a:ext>
-            </a:extLst>
-          </p:cNvPr>
-          <p:cNvSpPr txBox="1"/>
-          <p:nvPr/>
-        </p:nvSpPr>
-        <p:spPr>
-          <a:xfrm>
-            <a:off x="553927" y="437882"/>
-            <a:ext cx="6861943" cy="369332"/>
-          </a:xfrm>
-          <a:prstGeom prst="rect">
-            <a:avLst/>
-          </a:prstGeom>
-          <a:noFill/>
-        </p:spPr>
-        <p:txBody>
-          <a:bodyPr wrap="none" rtlCol="0">
-            <a:spAutoFit/>
-          </a:bodyPr>
-          <a:lstStyle/>
-          <a:p>
-            <a:r>
-              <a:rPr lang="en-US" altLang="ko-KR" dirty="0"/>
-              <a:t>3. SNU-BDA-Lab.github.io </a:t>
-            </a:r>
-            <a:r>
-              <a:rPr lang="ko-KR" altLang="en-US" dirty="0"/>
-              <a:t>라는 이름의 </a:t>
-            </a:r>
-            <a:r>
-              <a:rPr lang="en-US" altLang="ko-KR" dirty="0"/>
-              <a:t>repository</a:t>
-            </a:r>
-            <a:r>
-              <a:rPr lang="ko-KR" altLang="en-US" dirty="0"/>
-              <a:t>로 들어갑니다</a:t>
-            </a:r>
-            <a:r>
-              <a:rPr lang="en-US" altLang="ko-KR" dirty="0"/>
-              <a:t>.</a:t>
-            </a:r>
-            <a:endParaRPr lang="ko-KR" altLang="en-US" dirty="0"/>
-          </a:p>
-        </p:txBody>
-      </p:sp>
     </p:spTree>
     <p:extLst>
       <p:ext uri="{BB962C8B-B14F-4D97-AF65-F5344CB8AC3E}">
-        <p14:creationId xmlns:p14="http://schemas.microsoft.com/office/powerpoint/2010/main" val="4065431926"/>
+        <p14:creationId xmlns:p14="http://schemas.microsoft.com/office/powerpoint/2010/main" val="2402769647"/>
       </p:ext>
     </p:extLst>
   </p:cSld>
@@ -6068,108 +5601,12 @@
           <a:chExt cx="0" cy="0"/>
         </a:xfrm>
       </p:grpSpPr>
-      <p:sp>
-        <p:nvSpPr>
-          <p:cNvPr id="4" name="TextBox 3">
-            <a:extLst>
-              <a:ext uri="{FF2B5EF4-FFF2-40B4-BE49-F238E27FC236}">
-                <a16:creationId xmlns:a16="http://schemas.microsoft.com/office/drawing/2014/main" id="{BFADF8CE-1337-48D6-BD81-D19E12B2095B}"/>
-              </a:ext>
-            </a:extLst>
-          </p:cNvPr>
-          <p:cNvSpPr txBox="1"/>
-          <p:nvPr/>
-        </p:nvSpPr>
-        <p:spPr>
-          <a:xfrm>
-            <a:off x="553927" y="437882"/>
-            <a:ext cx="10041467" cy="923330"/>
-          </a:xfrm>
-          <a:prstGeom prst="rect">
-            <a:avLst/>
-          </a:prstGeom>
-          <a:noFill/>
-        </p:spPr>
-        <p:txBody>
-          <a:bodyPr wrap="none" rtlCol="0">
-            <a:spAutoFit/>
-          </a:bodyPr>
-          <a:lstStyle/>
-          <a:p>
-            <a:r>
-              <a:rPr lang="en-US" altLang="ko-KR" dirty="0"/>
-              <a:t>4. </a:t>
-            </a:r>
-            <a:r>
-              <a:rPr lang="ko-KR" altLang="en-US" dirty="0"/>
-              <a:t>수정하고자 하는 페이지를 </a:t>
-            </a:r>
-            <a:r>
-              <a:rPr lang="en-US" altLang="ko-KR" dirty="0"/>
-              <a:t>repository</a:t>
-            </a:r>
-            <a:r>
-              <a:rPr lang="ko-KR" altLang="en-US" dirty="0"/>
-              <a:t>에서 찾습니다</a:t>
-            </a:r>
-            <a:r>
-              <a:rPr lang="en-US" altLang="ko-KR" dirty="0"/>
-              <a:t>. markdown(.md)</a:t>
-            </a:r>
-            <a:r>
-              <a:rPr lang="ko-KR" altLang="en-US" dirty="0"/>
-              <a:t>파일을 찾으시면 됩니다</a:t>
-            </a:r>
-            <a:r>
-              <a:rPr lang="en-US" altLang="ko-KR" dirty="0"/>
-              <a:t>.</a:t>
-            </a:r>
-          </a:p>
-          <a:p>
-            <a:r>
-              <a:rPr lang="ko-KR" altLang="en-US" dirty="0"/>
-              <a:t>웹페이지에서 나오는 </a:t>
-            </a:r>
-            <a:r>
-              <a:rPr lang="en-US" altLang="ko-KR" dirty="0" err="1"/>
-              <a:t>url</a:t>
-            </a:r>
-            <a:r>
-              <a:rPr lang="ko-KR" altLang="en-US" dirty="0"/>
-              <a:t>을 참고하시면 빠르게 찾으실 수 있을 것입니다</a:t>
-            </a:r>
-            <a:r>
-              <a:rPr lang="en-US" altLang="ko-KR" dirty="0"/>
-              <a:t>.</a:t>
-            </a:r>
-          </a:p>
-          <a:p>
-            <a:r>
-              <a:rPr lang="ko-KR" altLang="en-US" dirty="0"/>
-              <a:t>여기서는 예시로 김형주 교수님의 </a:t>
-            </a:r>
-            <a:r>
-              <a:rPr lang="en-US" altLang="ko-KR" dirty="0"/>
-              <a:t>Publication</a:t>
-            </a:r>
-            <a:r>
-              <a:rPr lang="ko-KR" altLang="en-US" dirty="0"/>
-              <a:t>에 논문을 하나 추가해보겠습니다</a:t>
-            </a:r>
-            <a:r>
-              <a:rPr lang="en-US" altLang="ko-KR" dirty="0"/>
-              <a:t>. </a:t>
-            </a:r>
-            <a:endParaRPr lang="ko-KR" altLang="en-US" dirty="0"/>
-          </a:p>
-        </p:txBody>
-      </p:sp>
       <p:pic>
         <p:nvPicPr>
-          <p:cNvPr id="6" name="그림 5">
-            <a:extLst>
-              <a:ext uri="{FF2B5EF4-FFF2-40B4-BE49-F238E27FC236}">
-                <a16:creationId xmlns:a16="http://schemas.microsoft.com/office/drawing/2014/main" id="{8819BB91-0D68-46AD-AFDE-F98CA627E935}"/>
+          <p:cNvPr id="3" name="그림 2">
+            <a:extLst>
+              <a:ext uri="{FF2B5EF4-FFF2-40B4-BE49-F238E27FC236}">
+                <a16:creationId xmlns:a16="http://schemas.microsoft.com/office/drawing/2014/main" id="{6020DB3F-9735-1750-04AD-8965F44F80F7}"/>
               </a:ext>
             </a:extLst>
           </p:cNvPr>
@@ -6186,44 +5623,14 @@
         </p:blipFill>
         <p:spPr>
           <a:xfrm>
-            <a:off x="1639142" y="1828800"/>
-            <a:ext cx="8913716" cy="4475408"/>
+            <a:off x="2132867" y="1159133"/>
+            <a:ext cx="6630133" cy="5536941"/>
           </a:xfrm>
           <a:prstGeom prst="rect">
             <a:avLst/>
           </a:prstGeom>
         </p:spPr>
       </p:pic>
-    </p:spTree>
-    <p:extLst>
-      <p:ext uri="{BB962C8B-B14F-4D97-AF65-F5344CB8AC3E}">
-        <p14:creationId xmlns:p14="http://schemas.microsoft.com/office/powerpoint/2010/main" val="2402769647"/>
-      </p:ext>
-    </p:extLst>
-  </p:cSld>
-  <p:clrMapOvr>
-    <a:masterClrMapping/>
-  </p:clrMapOvr>
-</p:sld>
-</file>
-
-<file path=ppt/slides/slide8.xml><?xml version="1.0" encoding="utf-8"?>
-<p:sld xmlns:a="http://schemas.openxmlformats.org/drawingml/2006/main" xmlns:r="http://schemas.openxmlformats.org/officeDocument/2006/relationships" xmlns:p="http://schemas.openxmlformats.org/presentationml/2006/main">
-  <p:cSld>
-    <p:spTree>
-      <p:nvGrpSpPr>
-        <p:cNvPr id="1" name=""/>
-        <p:cNvGrpSpPr/>
-        <p:nvPr/>
-      </p:nvGrpSpPr>
-      <p:grpSpPr>
-        <a:xfrm>
-          <a:off x="0" y="0"/>
-          <a:ext cx="0" cy="0"/>
-          <a:chOff x="0" y="0"/>
-          <a:chExt cx="0" cy="0"/>
-        </a:xfrm>
-      </p:grpSpPr>
       <p:sp>
         <p:nvSpPr>
           <p:cNvPr id="4" name="TextBox 3">
@@ -6270,7 +5677,7 @@
             </a:r>
             <a:r>
               <a:rPr lang="fr-FR" altLang="ko-KR" dirty="0">
-                <a:hlinkClick r:id="rId2"/>
+                <a:hlinkClick r:id="rId3"/>
               </a:rPr>
               <a:t>https://snu-bda-lab.github.io/members/hyoung-joo_kim_publication</a:t>
             </a:r>
@@ -6303,11 +5710,11 @@
             </a:r>
             <a:r>
               <a:rPr lang="en-US" altLang="ko-KR" dirty="0"/>
-              <a:t>hyoung-joo_kim_publication.md</a:t>
-            </a:r>
-            <a:r>
-              <a:rPr lang="ko-KR" altLang="en-US" dirty="0"/>
-              <a:t>라는 파일입니다</a:t>
+              <a:t>hyoung-joo_kim_publication.html</a:t>
+            </a:r>
+            <a:r>
+              <a:rPr lang="ko-KR" altLang="en-US" dirty="0"/>
+              <a:t>이라는 파일입니다</a:t>
             </a:r>
             <a:r>
               <a:rPr lang="en-US" altLang="ko-KR" dirty="0"/>
@@ -6317,36 +5724,6 @@
           </a:p>
         </p:txBody>
       </p:sp>
-      <p:pic>
-        <p:nvPicPr>
-          <p:cNvPr id="5" name="그림 4">
-            <a:extLst>
-              <a:ext uri="{FF2B5EF4-FFF2-40B4-BE49-F238E27FC236}">
-                <a16:creationId xmlns:a16="http://schemas.microsoft.com/office/drawing/2014/main" id="{A493472D-88E3-4613-B2F2-5B3DFD2635B9}"/>
-              </a:ext>
-            </a:extLst>
-          </p:cNvPr>
-          <p:cNvPicPr>
-            <a:picLocks noChangeAspect="1"/>
-          </p:cNvPicPr>
-          <p:nvPr/>
-        </p:nvPicPr>
-        <p:blipFill>
-          <a:blip r:embed="rId3"/>
-          <a:stretch>
-            <a:fillRect/>
-          </a:stretch>
-        </p:blipFill>
-        <p:spPr>
-          <a:xfrm>
-            <a:off x="1434071" y="1569281"/>
-            <a:ext cx="9323858" cy="4762625"/>
-          </a:xfrm>
-          <a:prstGeom prst="rect">
-            <a:avLst/>
-          </a:prstGeom>
-        </p:spPr>
-      </p:pic>
       <p:sp>
         <p:nvSpPr>
           <p:cNvPr id="7" name="화살표: 왼쪽 6">
@@ -6361,7 +5738,7 @@
         </p:nvSpPr>
         <p:spPr>
           <a:xfrm>
-            <a:off x="4230913" y="4784347"/>
+            <a:off x="3715657" y="5194495"/>
             <a:ext cx="2380343" cy="1008743"/>
           </a:xfrm>
           <a:prstGeom prst="leftArrow">
@@ -6413,7 +5790,7 @@
         </p:nvCxnSpPr>
         <p:spPr>
           <a:xfrm>
-            <a:off x="3483429" y="5355771"/>
+            <a:off x="2968173" y="5765919"/>
             <a:ext cx="493485" cy="0"/>
           </a:xfrm>
           <a:prstGeom prst="line">
@@ -6453,6 +5830,186 @@
 </p:sld>
 </file>
 
+<file path=ppt/slides/slide8.xml><?xml version="1.0" encoding="utf-8"?>
+<p:sld xmlns:a="http://schemas.openxmlformats.org/drawingml/2006/main" xmlns:r="http://schemas.openxmlformats.org/officeDocument/2006/relationships" xmlns:p="http://schemas.openxmlformats.org/presentationml/2006/main">
+  <p:cSld>
+    <p:spTree>
+      <p:nvGrpSpPr>
+        <p:cNvPr id="1" name=""/>
+        <p:cNvGrpSpPr/>
+        <p:nvPr/>
+      </p:nvGrpSpPr>
+      <p:grpSpPr>
+        <a:xfrm>
+          <a:off x="0" y="0"/>
+          <a:ext cx="0" cy="0"/>
+          <a:chOff x="0" y="0"/>
+          <a:chExt cx="0" cy="0"/>
+        </a:xfrm>
+      </p:grpSpPr>
+      <p:pic>
+        <p:nvPicPr>
+          <p:cNvPr id="5" name="그림 4">
+            <a:extLst>
+              <a:ext uri="{FF2B5EF4-FFF2-40B4-BE49-F238E27FC236}">
+                <a16:creationId xmlns:a16="http://schemas.microsoft.com/office/drawing/2014/main" id="{6FB2F5A4-AA6F-6625-8023-89AD708C94B0}"/>
+              </a:ext>
+            </a:extLst>
+          </p:cNvPr>
+          <p:cNvPicPr>
+            <a:picLocks noChangeAspect="1"/>
+          </p:cNvPicPr>
+          <p:nvPr/>
+        </p:nvPicPr>
+        <p:blipFill>
+          <a:blip r:embed="rId2"/>
+          <a:stretch>
+            <a:fillRect/>
+          </a:stretch>
+        </p:blipFill>
+        <p:spPr>
+          <a:xfrm>
+            <a:off x="1485900" y="1221729"/>
+            <a:ext cx="9220200" cy="4414542"/>
+          </a:xfrm>
+          <a:prstGeom prst="rect">
+            <a:avLst/>
+          </a:prstGeom>
+        </p:spPr>
+      </p:pic>
+      <p:sp>
+        <p:nvSpPr>
+          <p:cNvPr id="4" name="TextBox 3">
+            <a:extLst>
+              <a:ext uri="{FF2B5EF4-FFF2-40B4-BE49-F238E27FC236}">
+                <a16:creationId xmlns:a16="http://schemas.microsoft.com/office/drawing/2014/main" id="{BFADF8CE-1337-48D6-BD81-D19E12B2095B}"/>
+              </a:ext>
+            </a:extLst>
+          </p:cNvPr>
+          <p:cNvSpPr txBox="1"/>
+          <p:nvPr/>
+        </p:nvSpPr>
+        <p:spPr>
+          <a:xfrm>
+            <a:off x="553927" y="437882"/>
+            <a:ext cx="6393097" cy="369332"/>
+          </a:xfrm>
+          <a:prstGeom prst="rect">
+            <a:avLst/>
+          </a:prstGeom>
+          <a:noFill/>
+        </p:spPr>
+        <p:txBody>
+          <a:bodyPr wrap="none" rtlCol="0">
+            <a:spAutoFit/>
+          </a:bodyPr>
+          <a:lstStyle/>
+          <a:p>
+            <a:r>
+              <a:rPr lang="en-US" altLang="ko-KR" dirty="0"/>
+              <a:t>6. </a:t>
+            </a:r>
+            <a:r>
+              <a:rPr lang="ko-KR" altLang="en-US" dirty="0"/>
+              <a:t>파일에 들어왔으면 </a:t>
+            </a:r>
+            <a:r>
+              <a:rPr lang="en-US" altLang="ko-KR" dirty="0"/>
+              <a:t>Edit</a:t>
+            </a:r>
+            <a:r>
+              <a:rPr lang="ko-KR" altLang="en-US" dirty="0"/>
+              <a:t> </a:t>
+            </a:r>
+            <a:r>
+              <a:rPr lang="en-US" altLang="ko-KR" dirty="0"/>
+              <a:t>this</a:t>
+            </a:r>
+            <a:r>
+              <a:rPr lang="ko-KR" altLang="en-US" dirty="0"/>
+              <a:t> </a:t>
+            </a:r>
+            <a:r>
+              <a:rPr lang="en-US" altLang="ko-KR" dirty="0"/>
+              <a:t>file</a:t>
+            </a:r>
+            <a:r>
+              <a:rPr lang="ko-KR" altLang="en-US" dirty="0"/>
+              <a:t>을 이용해 수정하겠습니다</a:t>
+            </a:r>
+            <a:r>
+              <a:rPr lang="en-US" altLang="ko-KR" dirty="0"/>
+              <a:t>.</a:t>
+            </a:r>
+            <a:endParaRPr lang="fr-FR" altLang="ko-KR" dirty="0"/>
+          </a:p>
+        </p:txBody>
+      </p:sp>
+      <p:sp>
+        <p:nvSpPr>
+          <p:cNvPr id="7" name="화살표: 왼쪽 6">
+            <a:extLst>
+              <a:ext uri="{FF2B5EF4-FFF2-40B4-BE49-F238E27FC236}">
+                <a16:creationId xmlns:a16="http://schemas.microsoft.com/office/drawing/2014/main" id="{347D7EB5-71CA-4123-BA3B-5318E48A39EF}"/>
+              </a:ext>
+            </a:extLst>
+          </p:cNvPr>
+          <p:cNvSpPr/>
+          <p:nvPr/>
+        </p:nvSpPr>
+        <p:spPr>
+          <a:xfrm rot="9067827">
+            <a:off x="7195029" y="3836687"/>
+            <a:ext cx="2380343" cy="1008743"/>
+          </a:xfrm>
+          <a:prstGeom prst="leftArrow">
+            <a:avLst/>
+          </a:prstGeom>
+          <a:solidFill>
+            <a:srgbClr val="FF0000"/>
+          </a:solidFill>
+          <a:ln>
+            <a:noFill/>
+          </a:ln>
+        </p:spPr>
+        <p:style>
+          <a:lnRef idx="2">
+            <a:schemeClr val="accent1">
+              <a:shade val="50000"/>
+            </a:schemeClr>
+          </a:lnRef>
+          <a:fillRef idx="1">
+            <a:schemeClr val="accent1"/>
+          </a:fillRef>
+          <a:effectRef idx="0">
+            <a:schemeClr val="accent1"/>
+          </a:effectRef>
+          <a:fontRef idx="minor">
+            <a:schemeClr val="lt1"/>
+          </a:fontRef>
+        </p:style>
+        <p:txBody>
+          <a:bodyPr rtlCol="0" anchor="ctr"/>
+          <a:lstStyle/>
+          <a:p>
+            <a:pPr algn="ctr"/>
+            <a:endParaRPr lang="ko-KR" altLang="en-US" dirty="0"/>
+          </a:p>
+        </p:txBody>
+      </p:sp>
+    </p:spTree>
+    <p:extLst>
+      <p:ext uri="{BB962C8B-B14F-4D97-AF65-F5344CB8AC3E}">
+        <p14:creationId xmlns:p14="http://schemas.microsoft.com/office/powerpoint/2010/main" val="884983915"/>
+      </p:ext>
+    </p:extLst>
+  </p:cSld>
+  <p:clrMapOvr>
+    <a:masterClrMapping/>
+  </p:clrMapOvr>
+</p:sld>
+</file>
+
 <file path=ppt/slides/slide9.xml><?xml version="1.0" encoding="utf-8"?>
 <p:sld xmlns:a="http://schemas.openxmlformats.org/drawingml/2006/main" xmlns:r="http://schemas.openxmlformats.org/officeDocument/2006/relationships" xmlns:p="http://schemas.openxmlformats.org/presentationml/2006/main">
   <p:cSld>
@@ -6485,7 +6042,7 @@
         <p:spPr>
           <a:xfrm>
             <a:off x="553927" y="437882"/>
-            <a:ext cx="6393097" cy="369332"/>
+            <a:ext cx="11526456" cy="646331"/>
           </a:xfrm>
           <a:prstGeom prst="rect">
             <a:avLst/>
@@ -6493,42 +6050,58 @@
           <a:noFill/>
         </p:spPr>
         <p:txBody>
-          <a:bodyPr wrap="none" rtlCol="0">
+          <a:bodyPr wrap="square" rtlCol="0">
             <a:spAutoFit/>
           </a:bodyPr>
           <a:lstStyle/>
           <a:p>
             <a:r>
               <a:rPr lang="en-US" altLang="ko-KR" dirty="0"/>
-              <a:t>6. </a:t>
-            </a:r>
-            <a:r>
-              <a:rPr lang="ko-KR" altLang="en-US" dirty="0"/>
-              <a:t>파일에 들어왔으면 </a:t>
-            </a:r>
-            <a:r>
-              <a:rPr lang="en-US" altLang="ko-KR" dirty="0"/>
-              <a:t>Edit</a:t>
-            </a:r>
-            <a:r>
-              <a:rPr lang="ko-KR" altLang="en-US" dirty="0"/>
-              <a:t> </a:t>
-            </a:r>
-            <a:r>
-              <a:rPr lang="en-US" altLang="ko-KR" dirty="0"/>
-              <a:t>this</a:t>
-            </a:r>
-            <a:r>
-              <a:rPr lang="ko-KR" altLang="en-US" dirty="0"/>
-              <a:t> </a:t>
-            </a:r>
-            <a:r>
-              <a:rPr lang="en-US" altLang="ko-KR" dirty="0"/>
-              <a:t>file</a:t>
-            </a:r>
-            <a:r>
-              <a:rPr lang="ko-KR" altLang="en-US" dirty="0"/>
-              <a:t>을 이용해 수정하겠습니다</a:t>
+              <a:t>7. members &gt; hyoung-joo_kim_publication.html</a:t>
+            </a:r>
+            <a:r>
+              <a:rPr lang="ko-KR" altLang="en-US" dirty="0"/>
+              <a:t>의 내용을 전부 복사해서 </a:t>
+            </a:r>
+            <a:r>
+              <a:rPr lang="en-US" altLang="ko-KR" dirty="0" err="1"/>
+              <a:t>vscode</a:t>
+            </a:r>
+            <a:r>
+              <a:rPr lang="ko-KR" altLang="en-US" dirty="0"/>
+              <a:t>나 </a:t>
+            </a:r>
+            <a:r>
+              <a:rPr lang="en-US" altLang="ko-KR" dirty="0"/>
+              <a:t>txt </a:t>
+            </a:r>
+            <a:r>
+              <a:rPr lang="ko-KR" altLang="en-US" dirty="0"/>
+              <a:t>파일로 </a:t>
+            </a:r>
+            <a:r>
+              <a:rPr lang="ko-KR" altLang="en-US" dirty="0" err="1"/>
+              <a:t>붙여넣은</a:t>
+            </a:r>
+            <a:r>
+              <a:rPr lang="ko-KR" altLang="en-US" dirty="0"/>
+              <a:t> 다음 수정하겠습니다</a:t>
+            </a:r>
+            <a:r>
+              <a:rPr lang="en-US" altLang="ko-KR" dirty="0"/>
+              <a:t>. </a:t>
+            </a:r>
+            <a:r>
+              <a:rPr lang="ko-KR" altLang="en-US" dirty="0"/>
+              <a:t>여기서는 </a:t>
+            </a:r>
+            <a:r>
+              <a:rPr lang="en-US" altLang="ko-KR" dirty="0" err="1"/>
+              <a:t>vscode</a:t>
+            </a:r>
+            <a:r>
+              <a:rPr lang="ko-KR" altLang="en-US" dirty="0"/>
+              <a:t>로 진행하겠습니다</a:t>
             </a:r>
             <a:r>
               <a:rPr lang="en-US" altLang="ko-KR" dirty="0"/>
@@ -6540,10 +6113,10 @@
       </p:sp>
       <p:pic>
         <p:nvPicPr>
-          <p:cNvPr id="3" name="그림 2">
-            <a:extLst>
-              <a:ext uri="{FF2B5EF4-FFF2-40B4-BE49-F238E27FC236}">
-                <a16:creationId xmlns:a16="http://schemas.microsoft.com/office/drawing/2014/main" id="{4482091B-ABF1-4D11-BFDF-7D33253C853F}"/>
+          <p:cNvPr id="5" name="그림 4">
+            <a:extLst>
+              <a:ext uri="{FF2B5EF4-FFF2-40B4-BE49-F238E27FC236}">
+                <a16:creationId xmlns:a16="http://schemas.microsoft.com/office/drawing/2014/main" id="{1F743D1B-4B57-C47C-651E-E22CAE4A3D92}"/>
               </a:ext>
             </a:extLst>
           </p:cNvPr>
@@ -6560,70 +6133,48 @@
         </p:blipFill>
         <p:spPr>
           <a:xfrm>
-            <a:off x="2141661" y="1435688"/>
-            <a:ext cx="7908678" cy="4572120"/>
+            <a:off x="644842" y="1323975"/>
+            <a:ext cx="7241692" cy="3894438"/>
           </a:xfrm>
           <a:prstGeom prst="rect">
             <a:avLst/>
           </a:prstGeom>
         </p:spPr>
       </p:pic>
-      <p:sp>
-        <p:nvSpPr>
-          <p:cNvPr id="7" name="화살표: 왼쪽 6">
-            <a:extLst>
-              <a:ext uri="{FF2B5EF4-FFF2-40B4-BE49-F238E27FC236}">
-                <a16:creationId xmlns:a16="http://schemas.microsoft.com/office/drawing/2014/main" id="{347D7EB5-71CA-4123-BA3B-5318E48A39EF}"/>
-              </a:ext>
-            </a:extLst>
-          </p:cNvPr>
-          <p:cNvSpPr/>
+      <p:pic>
+        <p:nvPicPr>
+          <p:cNvPr id="7" name="그림 6">
+            <a:extLst>
+              <a:ext uri="{FF2B5EF4-FFF2-40B4-BE49-F238E27FC236}">
+                <a16:creationId xmlns:a16="http://schemas.microsoft.com/office/drawing/2014/main" id="{2746B69C-3064-27F9-E403-93C1EA48F57D}"/>
+              </a:ext>
+            </a:extLst>
+          </p:cNvPr>
+          <p:cNvPicPr>
+            <a:picLocks noChangeAspect="1"/>
+          </p:cNvPicPr>
           <p:nvPr/>
-        </p:nvSpPr>
-        <p:spPr>
-          <a:xfrm rot="9067827">
-            <a:off x="7042631" y="3608087"/>
-            <a:ext cx="2380343" cy="1008743"/>
-          </a:xfrm>
-          <a:prstGeom prst="leftArrow">
+        </p:nvPicPr>
+        <p:blipFill>
+          <a:blip r:embed="rId3"/>
+          <a:stretch>
+            <a:fillRect/>
+          </a:stretch>
+        </p:blipFill>
+        <p:spPr>
+          <a:xfrm>
+            <a:off x="5614190" y="2395586"/>
+            <a:ext cx="5844385" cy="4229816"/>
+          </a:xfrm>
+          <a:prstGeom prst="rect">
             <a:avLst/>
           </a:prstGeom>
-          <a:solidFill>
-            <a:srgbClr val="FF0000"/>
-          </a:solidFill>
-          <a:ln>
-            <a:noFill/>
-          </a:ln>
-        </p:spPr>
-        <p:style>
-          <a:lnRef idx="2">
-            <a:schemeClr val="accent1">
-              <a:shade val="50000"/>
-            </a:schemeClr>
-          </a:lnRef>
-          <a:fillRef idx="1">
-            <a:schemeClr val="accent1"/>
-          </a:fillRef>
-          <a:effectRef idx="0">
-            <a:schemeClr val="accent1"/>
-          </a:effectRef>
-          <a:fontRef idx="minor">
-            <a:schemeClr val="lt1"/>
-          </a:fontRef>
-        </p:style>
-        <p:txBody>
-          <a:bodyPr rtlCol="0" anchor="ctr"/>
-          <a:lstStyle/>
-          <a:p>
-            <a:pPr algn="ctr"/>
-            <a:endParaRPr lang="ko-KR" altLang="en-US" dirty="0"/>
-          </a:p>
-        </p:txBody>
-      </p:sp>
+        </p:spPr>
+      </p:pic>
     </p:spTree>
     <p:extLst>
       <p:ext uri="{BB962C8B-B14F-4D97-AF65-F5344CB8AC3E}">
-        <p14:creationId xmlns:p14="http://schemas.microsoft.com/office/powerpoint/2010/main" val="884983915"/>
+        <p14:creationId xmlns:p14="http://schemas.microsoft.com/office/powerpoint/2010/main" val="3816512317"/>
       </p:ext>
     </p:extLst>
   </p:cSld>

</xml_diff>